<commit_message>
Addded 2 new tasks to presentation 3
</commit_message>
<xml_diff>
--- a/prezentacje/Prezentacja3.pptx
+++ b/prezentacje/Prezentacja3.pptx
@@ -5,7 +5,7 @@
     <p:sldMasterId id="2147483648" r:id="rId1"/>
   </p:sldMasterIdLst>
   <p:notesMasterIdLst>
-    <p:notesMasterId r:id="rId15"/>
+    <p:notesMasterId r:id="rId25"/>
   </p:notesMasterIdLst>
   <p:sldIdLst>
     <p:sldId id="256" r:id="rId4"/>
@@ -19,6 +19,16 @@
     <p:sldId id="264" r:id="rId12"/>
     <p:sldId id="265" r:id="rId13"/>
     <p:sldId id="266" r:id="rId14"/>
+    <p:sldId id="267" r:id="rId15"/>
+    <p:sldId id="268" r:id="rId16"/>
+    <p:sldId id="269" r:id="rId17"/>
+    <p:sldId id="270" r:id="rId18"/>
+    <p:sldId id="271" r:id="rId19"/>
+    <p:sldId id="272" r:id="rId20"/>
+    <p:sldId id="273" r:id="rId21"/>
+    <p:sldId id="274" r:id="rId22"/>
+    <p:sldId id="275" r:id="rId23"/>
+    <p:sldId id="276" r:id="rId24"/>
   </p:sldIdLst>
   <p:sldSz cx="12192000" cy="6858000"/>
   <p:notesSz cx="6858000" cy="9144000"/>
@@ -603,7 +613,7 @@
       </p:grpSpPr>
       <p:sp>
         <p:nvSpPr>
-          <p:cNvPr id="729129747" name="Symbol zastępczy obrazu slajdu 1"/>
+          <p:cNvPr id="1423415076" name="Symbol zastępczy obrazu slajdu 1"/>
           <p:cNvSpPr>
             <a:spLocks noChangeAspect="1" noGrp="1" noRot="1"/>
           </p:cNvSpPr>
@@ -620,7 +630,7 @@
       </p:sp>
       <p:sp>
         <p:nvSpPr>
-          <p:cNvPr id="8943275" name="Notatki Symbol zastępczy 2"/>
+          <p:cNvPr id="214914877" name="Notatki Symbol zastępczy 2"/>
           <p:cNvSpPr>
             <a:spLocks noGrp="1"/>
           </p:cNvSpPr>
@@ -645,7 +655,7 @@
       </p:sp>
       <p:sp>
         <p:nvSpPr>
-          <p:cNvPr id="653223132" name="Symbol zastępczy numeru slajdu 3"/>
+          <p:cNvPr id="1096233756" name="Symbol zastępczy numeru slajdu 3"/>
           <p:cNvSpPr>
             <a:spLocks noGrp="1"/>
           </p:cNvSpPr>
@@ -661,7 +671,7 @@
             <a:pPr>
               <a:defRPr/>
             </a:pPr>
-            <a:fld id="{DC2F461D-03E1-8B23-990B-8A1F4C9B57A7}" type="slidenum">
+            <a:fld id="{8B2414D8-1953-0CA6-C352-01B90CC12E59}" type="slidenum">
               <a:rPr lang="pl-PL"/>
               <a:t/>
             </a:fld>
@@ -693,7 +703,7 @@
       </p:grpSpPr>
       <p:sp>
         <p:nvSpPr>
-          <p:cNvPr id="1842332405" name="Symbol zastępczy obrazu slajdu 1"/>
+          <p:cNvPr id="298569861" name="Symbol zastępczy obrazu slajdu 1"/>
           <p:cNvSpPr>
             <a:spLocks noChangeAspect="1" noGrp="1" noRot="1"/>
           </p:cNvSpPr>
@@ -710,7 +720,7 @@
       </p:sp>
       <p:sp>
         <p:nvSpPr>
-          <p:cNvPr id="1421555433" name="Notatki Symbol zastępczy 2"/>
+          <p:cNvPr id="211312607" name="Notatki Symbol zastępczy 2"/>
           <p:cNvSpPr>
             <a:spLocks noGrp="1"/>
           </p:cNvSpPr>
@@ -735,7 +745,7 @@
       </p:sp>
       <p:sp>
         <p:nvSpPr>
-          <p:cNvPr id="1647434253" name="Symbol zastępczy numeru slajdu 3"/>
+          <p:cNvPr id="847295630" name="Symbol zastępczy numeru slajdu 3"/>
           <p:cNvSpPr>
             <a:spLocks noGrp="1"/>
           </p:cNvSpPr>
@@ -751,7 +761,727 @@
             <a:pPr>
               <a:defRPr/>
             </a:pPr>
-            <a:fld id="{7B34AC55-E08C-4580-F7B3-8F0F06BAEFE0}" type="slidenum">
+            <a:fld id="{FAE85A94-8D61-B985-0898-7640B9184B53}" type="slidenum">
+              <a:rPr lang="pl-PL"/>
+              <a:t/>
+            </a:fld>
+            <a:endParaRPr lang="pl-PL"/>
+          </a:p>
+        </p:txBody>
+      </p:sp>
+    </p:spTree>
+  </p:cSld>
+</p:notes>
+</file>
+
+<file path=ppt/notesSlides/notesSlide12.xml><?xml version="1.0" encoding="utf-8"?>
+<p:notes xmlns:a="http://schemas.openxmlformats.org/drawingml/2006/main" xmlns:r="http://schemas.openxmlformats.org/officeDocument/2006/relationships" xmlns:p="http://schemas.openxmlformats.org/presentationml/2006/main" xmlns:m="http://schemas.openxmlformats.org/officeDocument/2006/math" xmlns:w="http://schemas.openxmlformats.org/wordprocessingml/2006/main">
+  <p:cSld name="">
+    <p:spTree>
+      <p:nvGrpSpPr>
+        <p:cNvPr id="1" name=""/>
+        <p:cNvGrpSpPr/>
+        <p:nvPr/>
+      </p:nvGrpSpPr>
+      <p:grpSpPr bwMode="auto">
+        <a:xfrm>
+          <a:off x="0" y="0"/>
+          <a:ext cx="0" cy="0"/>
+          <a:chOff x="0" y="0"/>
+          <a:chExt cx="0" cy="0"/>
+        </a:xfrm>
+      </p:grpSpPr>
+      <p:sp>
+        <p:nvSpPr>
+          <p:cNvPr id="574364417" name="Symbol zastępczy obrazu slajdu 1"/>
+          <p:cNvSpPr>
+            <a:spLocks noChangeAspect="1" noGrp="1" noRot="1"/>
+          </p:cNvSpPr>
+          <p:nvPr>
+            <p:ph type="sldImg"/>
+          </p:nvPr>
+        </p:nvSpPr>
+        <p:spPr bwMode="auto">
+          <a:xfrm>
+            <a:off x="685800" y="1143000"/>
+            <a:ext cx="5486400" cy="3086100"/>
+          </a:xfrm>
+        </p:spPr>
+      </p:sp>
+      <p:sp>
+        <p:nvSpPr>
+          <p:cNvPr id="1083532531" name="Notatki Symbol zastępczy 2"/>
+          <p:cNvSpPr>
+            <a:spLocks noGrp="1"/>
+          </p:cNvSpPr>
+          <p:nvPr>
+            <p:ph type="body" idx="1"/>
+          </p:nvPr>
+        </p:nvSpPr>
+        <p:spPr bwMode="auto"/>
+        <p:txBody>
+          <a:bodyPr/>
+          <a:lstStyle/>
+          <a:p>
+            <a:pPr>
+              <a:defRPr/>
+            </a:pPr>
+            <a:endParaRPr lang="pl-PL">
+              <a:latin typeface="Arial"/>
+              <a:cs typeface="Arial"/>
+            </a:endParaRPr>
+          </a:p>
+        </p:txBody>
+      </p:sp>
+      <p:sp>
+        <p:nvSpPr>
+          <p:cNvPr id="1442439450" name="Symbol zastępczy numeru slajdu 3"/>
+          <p:cNvSpPr>
+            <a:spLocks noGrp="1"/>
+          </p:cNvSpPr>
+          <p:nvPr>
+            <p:ph type="sldNum" sz="quarter" idx="10"/>
+          </p:nvPr>
+        </p:nvSpPr>
+        <p:spPr bwMode="auto"/>
+        <p:txBody>
+          <a:bodyPr/>
+          <a:lstStyle/>
+          <a:p>
+            <a:pPr>
+              <a:defRPr/>
+            </a:pPr>
+            <a:fld id="{EED8C45D-1141-279B-F90E-E7949B071771}" type="slidenum">
+              <a:rPr lang="pl-PL"/>
+              <a:t/>
+            </a:fld>
+            <a:endParaRPr lang="pl-PL"/>
+          </a:p>
+        </p:txBody>
+      </p:sp>
+    </p:spTree>
+  </p:cSld>
+</p:notes>
+</file>
+
+<file path=ppt/notesSlides/notesSlide13.xml><?xml version="1.0" encoding="utf-8"?>
+<p:notes xmlns:a="http://schemas.openxmlformats.org/drawingml/2006/main" xmlns:r="http://schemas.openxmlformats.org/officeDocument/2006/relationships" xmlns:p="http://schemas.openxmlformats.org/presentationml/2006/main" xmlns:m="http://schemas.openxmlformats.org/officeDocument/2006/math" xmlns:w="http://schemas.openxmlformats.org/wordprocessingml/2006/main">
+  <p:cSld name="">
+    <p:spTree>
+      <p:nvGrpSpPr>
+        <p:cNvPr id="1" name=""/>
+        <p:cNvGrpSpPr/>
+        <p:nvPr/>
+      </p:nvGrpSpPr>
+      <p:grpSpPr bwMode="auto">
+        <a:xfrm>
+          <a:off x="0" y="0"/>
+          <a:ext cx="0" cy="0"/>
+          <a:chOff x="0" y="0"/>
+          <a:chExt cx="0" cy="0"/>
+        </a:xfrm>
+      </p:grpSpPr>
+      <p:sp>
+        <p:nvSpPr>
+          <p:cNvPr id="713868497" name="Symbol zastępczy obrazu slajdu 1"/>
+          <p:cNvSpPr>
+            <a:spLocks noChangeAspect="1" noGrp="1" noRot="1"/>
+          </p:cNvSpPr>
+          <p:nvPr>
+            <p:ph type="sldImg"/>
+          </p:nvPr>
+        </p:nvSpPr>
+        <p:spPr bwMode="auto">
+          <a:xfrm>
+            <a:off x="685800" y="1143000"/>
+            <a:ext cx="5486400" cy="3086100"/>
+          </a:xfrm>
+        </p:spPr>
+      </p:sp>
+      <p:sp>
+        <p:nvSpPr>
+          <p:cNvPr id="16762153" name="Notatki Symbol zastępczy 2"/>
+          <p:cNvSpPr>
+            <a:spLocks noGrp="1"/>
+          </p:cNvSpPr>
+          <p:nvPr>
+            <p:ph type="body" idx="1"/>
+          </p:nvPr>
+        </p:nvSpPr>
+        <p:spPr bwMode="auto"/>
+        <p:txBody>
+          <a:bodyPr/>
+          <a:lstStyle/>
+          <a:p>
+            <a:pPr>
+              <a:defRPr/>
+            </a:pPr>
+            <a:endParaRPr lang="pl-PL">
+              <a:latin typeface="Arial"/>
+              <a:cs typeface="Arial"/>
+            </a:endParaRPr>
+          </a:p>
+        </p:txBody>
+      </p:sp>
+      <p:sp>
+        <p:nvSpPr>
+          <p:cNvPr id="395339395" name="Symbol zastępczy numeru slajdu 3"/>
+          <p:cNvSpPr>
+            <a:spLocks noGrp="1"/>
+          </p:cNvSpPr>
+          <p:nvPr>
+            <p:ph type="sldNum" sz="quarter" idx="10"/>
+          </p:nvPr>
+        </p:nvSpPr>
+        <p:spPr bwMode="auto"/>
+        <p:txBody>
+          <a:bodyPr/>
+          <a:lstStyle/>
+          <a:p>
+            <a:pPr>
+              <a:defRPr/>
+            </a:pPr>
+            <a:fld id="{F540DED9-3D9E-4058-9A2F-EE7A0C7B630A}" type="slidenum">
+              <a:rPr lang="pl-PL"/>
+              <a:t/>
+            </a:fld>
+            <a:endParaRPr lang="pl-PL"/>
+          </a:p>
+        </p:txBody>
+      </p:sp>
+    </p:spTree>
+  </p:cSld>
+</p:notes>
+</file>
+
+<file path=ppt/notesSlides/notesSlide14.xml><?xml version="1.0" encoding="utf-8"?>
+<p:notes xmlns:a="http://schemas.openxmlformats.org/drawingml/2006/main" xmlns:r="http://schemas.openxmlformats.org/officeDocument/2006/relationships" xmlns:p="http://schemas.openxmlformats.org/presentationml/2006/main" xmlns:m="http://schemas.openxmlformats.org/officeDocument/2006/math" xmlns:w="http://schemas.openxmlformats.org/wordprocessingml/2006/main">
+  <p:cSld name="">
+    <p:spTree>
+      <p:nvGrpSpPr>
+        <p:cNvPr id="1" name=""/>
+        <p:cNvGrpSpPr/>
+        <p:nvPr/>
+      </p:nvGrpSpPr>
+      <p:grpSpPr bwMode="auto">
+        <a:xfrm>
+          <a:off x="0" y="0"/>
+          <a:ext cx="0" cy="0"/>
+          <a:chOff x="0" y="0"/>
+          <a:chExt cx="0" cy="0"/>
+        </a:xfrm>
+      </p:grpSpPr>
+      <p:sp>
+        <p:nvSpPr>
+          <p:cNvPr id="1824010268" name="Symbol zastępczy obrazu slajdu 1"/>
+          <p:cNvSpPr>
+            <a:spLocks noChangeAspect="1" noGrp="1" noRot="1"/>
+          </p:cNvSpPr>
+          <p:nvPr>
+            <p:ph type="sldImg"/>
+          </p:nvPr>
+        </p:nvSpPr>
+        <p:spPr bwMode="auto">
+          <a:xfrm>
+            <a:off x="685800" y="1143000"/>
+            <a:ext cx="5486400" cy="3086100"/>
+          </a:xfrm>
+        </p:spPr>
+      </p:sp>
+      <p:sp>
+        <p:nvSpPr>
+          <p:cNvPr id="152023688" name="Notatki Symbol zastępczy 2"/>
+          <p:cNvSpPr>
+            <a:spLocks noGrp="1"/>
+          </p:cNvSpPr>
+          <p:nvPr>
+            <p:ph type="body" idx="1"/>
+          </p:nvPr>
+        </p:nvSpPr>
+        <p:spPr bwMode="auto"/>
+        <p:txBody>
+          <a:bodyPr/>
+          <a:lstStyle/>
+          <a:p>
+            <a:pPr>
+              <a:defRPr/>
+            </a:pPr>
+            <a:endParaRPr lang="pl-PL">
+              <a:latin typeface="Arial"/>
+              <a:cs typeface="Arial"/>
+            </a:endParaRPr>
+          </a:p>
+        </p:txBody>
+      </p:sp>
+      <p:sp>
+        <p:nvSpPr>
+          <p:cNvPr id="280307514" name="Symbol zastępczy numeru slajdu 3"/>
+          <p:cNvSpPr>
+            <a:spLocks noGrp="1"/>
+          </p:cNvSpPr>
+          <p:nvPr>
+            <p:ph type="sldNum" sz="quarter" idx="10"/>
+          </p:nvPr>
+        </p:nvSpPr>
+        <p:spPr bwMode="auto"/>
+        <p:txBody>
+          <a:bodyPr/>
+          <a:lstStyle/>
+          <a:p>
+            <a:pPr>
+              <a:defRPr/>
+            </a:pPr>
+            <a:fld id="{1584C64D-F194-5A30-3BB3-6DF6BAB31ABE}" type="slidenum">
+              <a:rPr lang="pl-PL"/>
+              <a:t/>
+            </a:fld>
+            <a:endParaRPr lang="pl-PL"/>
+          </a:p>
+        </p:txBody>
+      </p:sp>
+    </p:spTree>
+  </p:cSld>
+</p:notes>
+</file>
+
+<file path=ppt/notesSlides/notesSlide15.xml><?xml version="1.0" encoding="utf-8"?>
+<p:notes xmlns:a="http://schemas.openxmlformats.org/drawingml/2006/main" xmlns:r="http://schemas.openxmlformats.org/officeDocument/2006/relationships" xmlns:p="http://schemas.openxmlformats.org/presentationml/2006/main" xmlns:m="http://schemas.openxmlformats.org/officeDocument/2006/math" xmlns:w="http://schemas.openxmlformats.org/wordprocessingml/2006/main">
+  <p:cSld name="">
+    <p:spTree>
+      <p:nvGrpSpPr>
+        <p:cNvPr id="1" name=""/>
+        <p:cNvGrpSpPr/>
+        <p:nvPr/>
+      </p:nvGrpSpPr>
+      <p:grpSpPr bwMode="auto">
+        <a:xfrm>
+          <a:off x="0" y="0"/>
+          <a:ext cx="0" cy="0"/>
+          <a:chOff x="0" y="0"/>
+          <a:chExt cx="0" cy="0"/>
+        </a:xfrm>
+      </p:grpSpPr>
+      <p:sp>
+        <p:nvSpPr>
+          <p:cNvPr id="1543434056" name="Symbol zastępczy obrazu slajdu 1"/>
+          <p:cNvSpPr>
+            <a:spLocks noChangeAspect="1" noGrp="1" noRot="1"/>
+          </p:cNvSpPr>
+          <p:nvPr>
+            <p:ph type="sldImg"/>
+          </p:nvPr>
+        </p:nvSpPr>
+        <p:spPr bwMode="auto">
+          <a:xfrm>
+            <a:off x="685800" y="1143000"/>
+            <a:ext cx="5486400" cy="3086100"/>
+          </a:xfrm>
+        </p:spPr>
+      </p:sp>
+      <p:sp>
+        <p:nvSpPr>
+          <p:cNvPr id="654786613" name="Notatki Symbol zastępczy 2"/>
+          <p:cNvSpPr>
+            <a:spLocks noGrp="1"/>
+          </p:cNvSpPr>
+          <p:nvPr>
+            <p:ph type="body" idx="1"/>
+          </p:nvPr>
+        </p:nvSpPr>
+        <p:spPr bwMode="auto"/>
+        <p:txBody>
+          <a:bodyPr/>
+          <a:lstStyle/>
+          <a:p>
+            <a:pPr>
+              <a:defRPr/>
+            </a:pPr>
+            <a:endParaRPr lang="pl-PL">
+              <a:latin typeface="Arial"/>
+              <a:cs typeface="Arial"/>
+            </a:endParaRPr>
+          </a:p>
+        </p:txBody>
+      </p:sp>
+      <p:sp>
+        <p:nvSpPr>
+          <p:cNvPr id="988650976" name="Symbol zastępczy numeru slajdu 3"/>
+          <p:cNvSpPr>
+            <a:spLocks noGrp="1"/>
+          </p:cNvSpPr>
+          <p:nvPr>
+            <p:ph type="sldNum" sz="quarter" idx="10"/>
+          </p:nvPr>
+        </p:nvSpPr>
+        <p:spPr bwMode="auto"/>
+        <p:txBody>
+          <a:bodyPr/>
+          <a:lstStyle/>
+          <a:p>
+            <a:pPr>
+              <a:defRPr/>
+            </a:pPr>
+            <a:fld id="{D34824BB-6CE4-09A9-A11A-5E4F84C9E65B}" type="slidenum">
+              <a:rPr lang="pl-PL"/>
+              <a:t/>
+            </a:fld>
+            <a:endParaRPr lang="pl-PL"/>
+          </a:p>
+        </p:txBody>
+      </p:sp>
+    </p:spTree>
+  </p:cSld>
+</p:notes>
+</file>
+
+<file path=ppt/notesSlides/notesSlide16.xml><?xml version="1.0" encoding="utf-8"?>
+<p:notes xmlns:a="http://schemas.openxmlformats.org/drawingml/2006/main" xmlns:r="http://schemas.openxmlformats.org/officeDocument/2006/relationships" xmlns:p="http://schemas.openxmlformats.org/presentationml/2006/main" xmlns:m="http://schemas.openxmlformats.org/officeDocument/2006/math" xmlns:w="http://schemas.openxmlformats.org/wordprocessingml/2006/main">
+  <p:cSld name="">
+    <p:spTree>
+      <p:nvGrpSpPr>
+        <p:cNvPr id="1" name=""/>
+        <p:cNvGrpSpPr/>
+        <p:nvPr/>
+      </p:nvGrpSpPr>
+      <p:grpSpPr bwMode="auto">
+        <a:xfrm>
+          <a:off x="0" y="0"/>
+          <a:ext cx="0" cy="0"/>
+          <a:chOff x="0" y="0"/>
+          <a:chExt cx="0" cy="0"/>
+        </a:xfrm>
+      </p:grpSpPr>
+      <p:sp>
+        <p:nvSpPr>
+          <p:cNvPr id="11831703" name="Symbol zastępczy obrazu slajdu 1"/>
+          <p:cNvSpPr>
+            <a:spLocks noChangeAspect="1" noGrp="1" noRot="1"/>
+          </p:cNvSpPr>
+          <p:nvPr>
+            <p:ph type="sldImg"/>
+          </p:nvPr>
+        </p:nvSpPr>
+        <p:spPr bwMode="auto">
+          <a:xfrm>
+            <a:off x="685800" y="1143000"/>
+            <a:ext cx="5486400" cy="3086100"/>
+          </a:xfrm>
+        </p:spPr>
+      </p:sp>
+      <p:sp>
+        <p:nvSpPr>
+          <p:cNvPr id="871148421" name="Notatki Symbol zastępczy 2"/>
+          <p:cNvSpPr>
+            <a:spLocks noGrp="1"/>
+          </p:cNvSpPr>
+          <p:nvPr>
+            <p:ph type="body" idx="1"/>
+          </p:nvPr>
+        </p:nvSpPr>
+        <p:spPr bwMode="auto"/>
+        <p:txBody>
+          <a:bodyPr/>
+          <a:lstStyle/>
+          <a:p>
+            <a:pPr>
+              <a:defRPr/>
+            </a:pPr>
+            <a:endParaRPr lang="pl-PL">
+              <a:latin typeface="Arial"/>
+              <a:cs typeface="Arial"/>
+            </a:endParaRPr>
+          </a:p>
+        </p:txBody>
+      </p:sp>
+      <p:sp>
+        <p:nvSpPr>
+          <p:cNvPr id="2094279939" name="Symbol zastępczy numeru slajdu 3"/>
+          <p:cNvSpPr>
+            <a:spLocks noGrp="1"/>
+          </p:cNvSpPr>
+          <p:nvPr>
+            <p:ph type="sldNum" sz="quarter" idx="10"/>
+          </p:nvPr>
+        </p:nvSpPr>
+        <p:spPr bwMode="auto"/>
+        <p:txBody>
+          <a:bodyPr/>
+          <a:lstStyle/>
+          <a:p>
+            <a:pPr>
+              <a:defRPr/>
+            </a:pPr>
+            <a:fld id="{044D0507-D4A1-4307-C663-1E261F7CB95A}" type="slidenum">
+              <a:rPr lang="pl-PL"/>
+              <a:t/>
+            </a:fld>
+            <a:endParaRPr lang="pl-PL"/>
+          </a:p>
+        </p:txBody>
+      </p:sp>
+    </p:spTree>
+  </p:cSld>
+</p:notes>
+</file>
+
+<file path=ppt/notesSlides/notesSlide17.xml><?xml version="1.0" encoding="utf-8"?>
+<p:notes xmlns:a="http://schemas.openxmlformats.org/drawingml/2006/main" xmlns:r="http://schemas.openxmlformats.org/officeDocument/2006/relationships" xmlns:p="http://schemas.openxmlformats.org/presentationml/2006/main" xmlns:m="http://schemas.openxmlformats.org/officeDocument/2006/math" xmlns:w="http://schemas.openxmlformats.org/wordprocessingml/2006/main">
+  <p:cSld name="">
+    <p:spTree>
+      <p:nvGrpSpPr>
+        <p:cNvPr id="1" name=""/>
+        <p:cNvGrpSpPr/>
+        <p:nvPr/>
+      </p:nvGrpSpPr>
+      <p:grpSpPr bwMode="auto">
+        <a:xfrm>
+          <a:off x="0" y="0"/>
+          <a:ext cx="0" cy="0"/>
+          <a:chOff x="0" y="0"/>
+          <a:chExt cx="0" cy="0"/>
+        </a:xfrm>
+      </p:grpSpPr>
+      <p:sp>
+        <p:nvSpPr>
+          <p:cNvPr id="453786206" name="Symbol zastępczy obrazu slajdu 1"/>
+          <p:cNvSpPr>
+            <a:spLocks noChangeAspect="1" noGrp="1" noRot="1"/>
+          </p:cNvSpPr>
+          <p:nvPr>
+            <p:ph type="sldImg"/>
+          </p:nvPr>
+        </p:nvSpPr>
+        <p:spPr bwMode="auto">
+          <a:xfrm>
+            <a:off x="685800" y="1143000"/>
+            <a:ext cx="5486400" cy="3086100"/>
+          </a:xfrm>
+        </p:spPr>
+      </p:sp>
+      <p:sp>
+        <p:nvSpPr>
+          <p:cNvPr id="281726496" name="Notatki Symbol zastępczy 2"/>
+          <p:cNvSpPr>
+            <a:spLocks noGrp="1"/>
+          </p:cNvSpPr>
+          <p:nvPr>
+            <p:ph type="body" idx="1"/>
+          </p:nvPr>
+        </p:nvSpPr>
+        <p:spPr bwMode="auto"/>
+        <p:txBody>
+          <a:bodyPr/>
+          <a:lstStyle/>
+          <a:p>
+            <a:pPr>
+              <a:defRPr/>
+            </a:pPr>
+            <a:endParaRPr lang="pl-PL">
+              <a:latin typeface="Arial"/>
+              <a:cs typeface="Arial"/>
+            </a:endParaRPr>
+          </a:p>
+        </p:txBody>
+      </p:sp>
+      <p:sp>
+        <p:nvSpPr>
+          <p:cNvPr id="655547721" name="Symbol zastępczy numeru slajdu 3"/>
+          <p:cNvSpPr>
+            <a:spLocks noGrp="1"/>
+          </p:cNvSpPr>
+          <p:nvPr>
+            <p:ph type="sldNum" sz="quarter" idx="10"/>
+          </p:nvPr>
+        </p:nvSpPr>
+        <p:spPr bwMode="auto"/>
+        <p:txBody>
+          <a:bodyPr/>
+          <a:lstStyle/>
+          <a:p>
+            <a:pPr>
+              <a:defRPr/>
+            </a:pPr>
+            <a:fld id="{4FE59E79-6E88-CAAC-FBAE-88A3E4E037F3}" type="slidenum">
+              <a:rPr lang="pl-PL"/>
+              <a:t/>
+            </a:fld>
+            <a:endParaRPr lang="pl-PL"/>
+          </a:p>
+        </p:txBody>
+      </p:sp>
+    </p:spTree>
+  </p:cSld>
+</p:notes>
+</file>
+
+<file path=ppt/notesSlides/notesSlide18.xml><?xml version="1.0" encoding="utf-8"?>
+<p:notes xmlns:a="http://schemas.openxmlformats.org/drawingml/2006/main" xmlns:r="http://schemas.openxmlformats.org/officeDocument/2006/relationships" xmlns:p="http://schemas.openxmlformats.org/presentationml/2006/main" xmlns:m="http://schemas.openxmlformats.org/officeDocument/2006/math" xmlns:w="http://schemas.openxmlformats.org/wordprocessingml/2006/main">
+  <p:cSld name="">
+    <p:spTree>
+      <p:nvGrpSpPr>
+        <p:cNvPr id="1" name=""/>
+        <p:cNvGrpSpPr/>
+        <p:nvPr/>
+      </p:nvGrpSpPr>
+      <p:grpSpPr bwMode="auto">
+        <a:xfrm>
+          <a:off x="0" y="0"/>
+          <a:ext cx="0" cy="0"/>
+          <a:chOff x="0" y="0"/>
+          <a:chExt cx="0" cy="0"/>
+        </a:xfrm>
+      </p:grpSpPr>
+      <p:sp>
+        <p:nvSpPr>
+          <p:cNvPr id="1276314705" name="Symbol zastępczy obrazu slajdu 1"/>
+          <p:cNvSpPr>
+            <a:spLocks noChangeAspect="1" noGrp="1" noRot="1"/>
+          </p:cNvSpPr>
+          <p:nvPr>
+            <p:ph type="sldImg"/>
+          </p:nvPr>
+        </p:nvSpPr>
+        <p:spPr bwMode="auto">
+          <a:xfrm>
+            <a:off x="685800" y="1143000"/>
+            <a:ext cx="5486400" cy="3086100"/>
+          </a:xfrm>
+        </p:spPr>
+      </p:sp>
+      <p:sp>
+        <p:nvSpPr>
+          <p:cNvPr id="954228837" name="Notatki Symbol zastępczy 2"/>
+          <p:cNvSpPr>
+            <a:spLocks noGrp="1"/>
+          </p:cNvSpPr>
+          <p:nvPr>
+            <p:ph type="body" idx="1"/>
+          </p:nvPr>
+        </p:nvSpPr>
+        <p:spPr bwMode="auto"/>
+        <p:txBody>
+          <a:bodyPr/>
+          <a:lstStyle/>
+          <a:p>
+            <a:pPr>
+              <a:defRPr/>
+            </a:pPr>
+            <a:endParaRPr lang="pl-PL">
+              <a:latin typeface="Arial"/>
+              <a:cs typeface="Arial"/>
+            </a:endParaRPr>
+          </a:p>
+        </p:txBody>
+      </p:sp>
+      <p:sp>
+        <p:nvSpPr>
+          <p:cNvPr id="1658229345" name="Symbol zastępczy numeru slajdu 3"/>
+          <p:cNvSpPr>
+            <a:spLocks noGrp="1"/>
+          </p:cNvSpPr>
+          <p:nvPr>
+            <p:ph type="sldNum" sz="quarter" idx="10"/>
+          </p:nvPr>
+        </p:nvSpPr>
+        <p:spPr bwMode="auto"/>
+        <p:txBody>
+          <a:bodyPr/>
+          <a:lstStyle/>
+          <a:p>
+            <a:pPr>
+              <a:defRPr/>
+            </a:pPr>
+            <a:fld id="{4D5EA36E-4EB9-FC7A-EB40-5B0789A39103}" type="slidenum">
+              <a:rPr lang="pl-PL"/>
+              <a:t/>
+            </a:fld>
+            <a:endParaRPr lang="pl-PL"/>
+          </a:p>
+        </p:txBody>
+      </p:sp>
+    </p:spTree>
+  </p:cSld>
+</p:notes>
+</file>
+
+<file path=ppt/notesSlides/notesSlide19.xml><?xml version="1.0" encoding="utf-8"?>
+<p:notes xmlns:a="http://schemas.openxmlformats.org/drawingml/2006/main" xmlns:r="http://schemas.openxmlformats.org/officeDocument/2006/relationships" xmlns:p="http://schemas.openxmlformats.org/presentationml/2006/main" xmlns:m="http://schemas.openxmlformats.org/officeDocument/2006/math" xmlns:w="http://schemas.openxmlformats.org/wordprocessingml/2006/main">
+  <p:cSld name="">
+    <p:spTree>
+      <p:nvGrpSpPr>
+        <p:cNvPr id="1" name=""/>
+        <p:cNvGrpSpPr/>
+        <p:nvPr/>
+      </p:nvGrpSpPr>
+      <p:grpSpPr bwMode="auto">
+        <a:xfrm>
+          <a:off x="0" y="0"/>
+          <a:ext cx="0" cy="0"/>
+          <a:chOff x="0" y="0"/>
+          <a:chExt cx="0" cy="0"/>
+        </a:xfrm>
+      </p:grpSpPr>
+      <p:sp>
+        <p:nvSpPr>
+          <p:cNvPr id="875908464" name="Symbol zastępczy obrazu slajdu 1"/>
+          <p:cNvSpPr>
+            <a:spLocks noChangeAspect="1" noGrp="1" noRot="1"/>
+          </p:cNvSpPr>
+          <p:nvPr>
+            <p:ph type="sldImg"/>
+          </p:nvPr>
+        </p:nvSpPr>
+        <p:spPr bwMode="auto">
+          <a:xfrm>
+            <a:off x="685800" y="1143000"/>
+            <a:ext cx="5486400" cy="3086100"/>
+          </a:xfrm>
+        </p:spPr>
+      </p:sp>
+      <p:sp>
+        <p:nvSpPr>
+          <p:cNvPr id="1095163676" name="Notatki Symbol zastępczy 2"/>
+          <p:cNvSpPr>
+            <a:spLocks noGrp="1"/>
+          </p:cNvSpPr>
+          <p:nvPr>
+            <p:ph type="body" idx="1"/>
+          </p:nvPr>
+        </p:nvSpPr>
+        <p:spPr bwMode="auto"/>
+        <p:txBody>
+          <a:bodyPr/>
+          <a:lstStyle/>
+          <a:p>
+            <a:pPr>
+              <a:defRPr/>
+            </a:pPr>
+            <a:endParaRPr lang="pl-PL">
+              <a:latin typeface="Arial"/>
+              <a:cs typeface="Arial"/>
+            </a:endParaRPr>
+          </a:p>
+        </p:txBody>
+      </p:sp>
+      <p:sp>
+        <p:nvSpPr>
+          <p:cNvPr id="1123868225" name="Symbol zastępczy numeru slajdu 3"/>
+          <p:cNvSpPr>
+            <a:spLocks noGrp="1"/>
+          </p:cNvSpPr>
+          <p:nvPr>
+            <p:ph type="sldNum" sz="quarter" idx="10"/>
+          </p:nvPr>
+        </p:nvSpPr>
+        <p:spPr bwMode="auto"/>
+        <p:txBody>
+          <a:bodyPr/>
+          <a:lstStyle/>
+          <a:p>
+            <a:pPr>
+              <a:defRPr/>
+            </a:pPr>
+            <a:fld id="{C9F20DC5-689C-B401-68FA-7088809F3DBC}" type="slidenum">
               <a:rPr lang="pl-PL"/>
               <a:t/>
             </a:fld>
@@ -854,6 +1584,186 @@
 </p:notes>
 </file>
 
+<file path=ppt/notesSlides/notesSlide20.xml><?xml version="1.0" encoding="utf-8"?>
+<p:notes xmlns:a="http://schemas.openxmlformats.org/drawingml/2006/main" xmlns:r="http://schemas.openxmlformats.org/officeDocument/2006/relationships" xmlns:p="http://schemas.openxmlformats.org/presentationml/2006/main" xmlns:m="http://schemas.openxmlformats.org/officeDocument/2006/math" xmlns:w="http://schemas.openxmlformats.org/wordprocessingml/2006/main">
+  <p:cSld name="">
+    <p:spTree>
+      <p:nvGrpSpPr>
+        <p:cNvPr id="1" name=""/>
+        <p:cNvGrpSpPr/>
+        <p:nvPr/>
+      </p:nvGrpSpPr>
+      <p:grpSpPr bwMode="auto">
+        <a:xfrm>
+          <a:off x="0" y="0"/>
+          <a:ext cx="0" cy="0"/>
+          <a:chOff x="0" y="0"/>
+          <a:chExt cx="0" cy="0"/>
+        </a:xfrm>
+      </p:grpSpPr>
+      <p:sp>
+        <p:nvSpPr>
+          <p:cNvPr id="729129747" name="Symbol zastępczy obrazu slajdu 1"/>
+          <p:cNvSpPr>
+            <a:spLocks noChangeAspect="1" noGrp="1" noRot="1"/>
+          </p:cNvSpPr>
+          <p:nvPr>
+            <p:ph type="sldImg"/>
+          </p:nvPr>
+        </p:nvSpPr>
+        <p:spPr bwMode="auto">
+          <a:xfrm>
+            <a:off x="685800" y="1143000"/>
+            <a:ext cx="5486400" cy="3086100"/>
+          </a:xfrm>
+        </p:spPr>
+      </p:sp>
+      <p:sp>
+        <p:nvSpPr>
+          <p:cNvPr id="8943275" name="Notatki Symbol zastępczy 2"/>
+          <p:cNvSpPr>
+            <a:spLocks noGrp="1"/>
+          </p:cNvSpPr>
+          <p:nvPr>
+            <p:ph type="body" idx="1"/>
+          </p:nvPr>
+        </p:nvSpPr>
+        <p:spPr bwMode="auto"/>
+        <p:txBody>
+          <a:bodyPr/>
+          <a:lstStyle/>
+          <a:p>
+            <a:pPr>
+              <a:defRPr/>
+            </a:pPr>
+            <a:endParaRPr lang="pl-PL">
+              <a:latin typeface="Arial"/>
+              <a:cs typeface="Arial"/>
+            </a:endParaRPr>
+          </a:p>
+        </p:txBody>
+      </p:sp>
+      <p:sp>
+        <p:nvSpPr>
+          <p:cNvPr id="653223132" name="Symbol zastępczy numeru slajdu 3"/>
+          <p:cNvSpPr>
+            <a:spLocks noGrp="1"/>
+          </p:cNvSpPr>
+          <p:nvPr>
+            <p:ph type="sldNum" sz="quarter" idx="10"/>
+          </p:nvPr>
+        </p:nvSpPr>
+        <p:spPr bwMode="auto"/>
+        <p:txBody>
+          <a:bodyPr/>
+          <a:lstStyle/>
+          <a:p>
+            <a:pPr>
+              <a:defRPr/>
+            </a:pPr>
+            <a:fld id="{DC2F461D-03E1-8B23-990B-8A1F4C9B57A7}" type="slidenum">
+              <a:rPr lang="pl-PL"/>
+              <a:t/>
+            </a:fld>
+            <a:endParaRPr lang="pl-PL"/>
+          </a:p>
+        </p:txBody>
+      </p:sp>
+    </p:spTree>
+  </p:cSld>
+</p:notes>
+</file>
+
+<file path=ppt/notesSlides/notesSlide21.xml><?xml version="1.0" encoding="utf-8"?>
+<p:notes xmlns:a="http://schemas.openxmlformats.org/drawingml/2006/main" xmlns:r="http://schemas.openxmlformats.org/officeDocument/2006/relationships" xmlns:p="http://schemas.openxmlformats.org/presentationml/2006/main" xmlns:m="http://schemas.openxmlformats.org/officeDocument/2006/math" xmlns:w="http://schemas.openxmlformats.org/wordprocessingml/2006/main">
+  <p:cSld name="">
+    <p:spTree>
+      <p:nvGrpSpPr>
+        <p:cNvPr id="1" name=""/>
+        <p:cNvGrpSpPr/>
+        <p:nvPr/>
+      </p:nvGrpSpPr>
+      <p:grpSpPr bwMode="auto">
+        <a:xfrm>
+          <a:off x="0" y="0"/>
+          <a:ext cx="0" cy="0"/>
+          <a:chOff x="0" y="0"/>
+          <a:chExt cx="0" cy="0"/>
+        </a:xfrm>
+      </p:grpSpPr>
+      <p:sp>
+        <p:nvSpPr>
+          <p:cNvPr id="1842332405" name="Symbol zastępczy obrazu slajdu 1"/>
+          <p:cNvSpPr>
+            <a:spLocks noChangeAspect="1" noGrp="1" noRot="1"/>
+          </p:cNvSpPr>
+          <p:nvPr>
+            <p:ph type="sldImg"/>
+          </p:nvPr>
+        </p:nvSpPr>
+        <p:spPr bwMode="auto">
+          <a:xfrm>
+            <a:off x="685800" y="1143000"/>
+            <a:ext cx="5486400" cy="3086100"/>
+          </a:xfrm>
+        </p:spPr>
+      </p:sp>
+      <p:sp>
+        <p:nvSpPr>
+          <p:cNvPr id="1421555433" name="Notatki Symbol zastępczy 2"/>
+          <p:cNvSpPr>
+            <a:spLocks noGrp="1"/>
+          </p:cNvSpPr>
+          <p:nvPr>
+            <p:ph type="body" idx="1"/>
+          </p:nvPr>
+        </p:nvSpPr>
+        <p:spPr bwMode="auto"/>
+        <p:txBody>
+          <a:bodyPr/>
+          <a:lstStyle/>
+          <a:p>
+            <a:pPr>
+              <a:defRPr/>
+            </a:pPr>
+            <a:endParaRPr lang="pl-PL">
+              <a:latin typeface="Arial"/>
+              <a:cs typeface="Arial"/>
+            </a:endParaRPr>
+          </a:p>
+        </p:txBody>
+      </p:sp>
+      <p:sp>
+        <p:nvSpPr>
+          <p:cNvPr id="1647434253" name="Symbol zastępczy numeru slajdu 3"/>
+          <p:cNvSpPr>
+            <a:spLocks noGrp="1"/>
+          </p:cNvSpPr>
+          <p:nvPr>
+            <p:ph type="sldNum" sz="quarter" idx="10"/>
+          </p:nvPr>
+        </p:nvSpPr>
+        <p:spPr bwMode="auto"/>
+        <p:txBody>
+          <a:bodyPr/>
+          <a:lstStyle/>
+          <a:p>
+            <a:pPr>
+              <a:defRPr/>
+            </a:pPr>
+            <a:fld id="{7B34AC55-E08C-4580-F7B3-8F0F06BAEFE0}" type="slidenum">
+              <a:rPr lang="pl-PL"/>
+              <a:t/>
+            </a:fld>
+            <a:endParaRPr lang="pl-PL"/>
+          </a:p>
+        </p:txBody>
+      </p:sp>
+    </p:spTree>
+  </p:cSld>
+</p:notes>
+</file>
+
 <file path=ppt/notesSlides/notesSlide3.xml><?xml version="1.0" encoding="utf-8"?>
 <p:notes xmlns:a="http://schemas.openxmlformats.org/drawingml/2006/main" xmlns:r="http://schemas.openxmlformats.org/officeDocument/2006/relationships" xmlns:p="http://schemas.openxmlformats.org/presentationml/2006/main" xmlns:m="http://schemas.openxmlformats.org/officeDocument/2006/math" xmlns:w="http://schemas.openxmlformats.org/wordprocessingml/2006/main">
   <p:cSld name="">
@@ -1323,7 +2233,7 @@
       </p:grpSpPr>
       <p:sp>
         <p:nvSpPr>
-          <p:cNvPr id="1851290233" name="Symbol zastępczy obrazu slajdu 1"/>
+          <p:cNvPr id="1896233619" name="Symbol zastępczy obrazu slajdu 1"/>
           <p:cNvSpPr>
             <a:spLocks noChangeAspect="1" noGrp="1" noRot="1"/>
           </p:cNvSpPr>
@@ -1340,7 +2250,7 @@
       </p:sp>
       <p:sp>
         <p:nvSpPr>
-          <p:cNvPr id="1495504580" name="Notatki Symbol zastępczy 2"/>
+          <p:cNvPr id="1301118311" name="Notatki Symbol zastępczy 2"/>
           <p:cNvSpPr>
             <a:spLocks noGrp="1"/>
           </p:cNvSpPr>
@@ -1365,7 +2275,7 @@
       </p:sp>
       <p:sp>
         <p:nvSpPr>
-          <p:cNvPr id="441732952" name="Symbol zastępczy numeru slajdu 3"/>
+          <p:cNvPr id="69521614" name="Symbol zastępczy numeru slajdu 3"/>
           <p:cNvSpPr>
             <a:spLocks noGrp="1"/>
           </p:cNvSpPr>
@@ -1381,7 +2291,7 @@
             <a:pPr>
               <a:defRPr/>
             </a:pPr>
-            <a:fld id="{F72439CC-E8F7-3F7F-60EE-5BA01CDC69BF}" type="slidenum">
+            <a:fld id="{04825AD0-8C8A-A124-9D86-9D05FC5BF952}" type="slidenum">
               <a:rPr lang="pl-PL"/>
               <a:t/>
             </a:fld>
@@ -1413,7 +2323,7 @@
       </p:grpSpPr>
       <p:sp>
         <p:nvSpPr>
-          <p:cNvPr id="713868497" name="Symbol zastępczy obrazu slajdu 1"/>
+          <p:cNvPr id="1851290233" name="Symbol zastępczy obrazu slajdu 1"/>
           <p:cNvSpPr>
             <a:spLocks noChangeAspect="1" noGrp="1" noRot="1"/>
           </p:cNvSpPr>
@@ -1430,7 +2340,7 @@
       </p:sp>
       <p:sp>
         <p:nvSpPr>
-          <p:cNvPr id="16762153" name="Notatki Symbol zastępczy 2"/>
+          <p:cNvPr id="1495504580" name="Notatki Symbol zastępczy 2"/>
           <p:cNvSpPr>
             <a:spLocks noGrp="1"/>
           </p:cNvSpPr>
@@ -1455,7 +2365,7 @@
       </p:sp>
       <p:sp>
         <p:nvSpPr>
-          <p:cNvPr id="395339395" name="Symbol zastępczy numeru slajdu 3"/>
+          <p:cNvPr id="441732952" name="Symbol zastępczy numeru slajdu 3"/>
           <p:cNvSpPr>
             <a:spLocks noGrp="1"/>
           </p:cNvSpPr>
@@ -1471,7 +2381,7 @@
             <a:pPr>
               <a:defRPr/>
             </a:pPr>
-            <a:fld id="{F540DED9-3D9E-4058-9A2F-EE7A0C7B630A}" type="slidenum">
+            <a:fld id="{F72439CC-E8F7-3F7F-60EE-5BA01CDC69BF}" type="slidenum">
               <a:rPr lang="pl-PL"/>
               <a:t/>
             </a:fld>
@@ -4791,7 +5701,7 @@
       </p:grpSpPr>
       <p:sp>
         <p:nvSpPr>
-          <p:cNvPr id="1430334485" name="Tytuł 1"/>
+          <p:cNvPr id="1216633748" name="Tytuł 1"/>
           <p:cNvSpPr>
             <a:spLocks noGrp="1"/>
           </p:cNvSpPr>
@@ -4807,13 +5717,17 @@
             <a:pPr>
               <a:defRPr/>
             </a:pPr>
-            <a:endParaRPr/>
-          </a:p>
-        </p:txBody>
-      </p:sp>
-      <p:sp>
-        <p:nvSpPr>
-          <p:cNvPr id="1177303339" name="Symbol zastępczy zawartości 2"/>
+            <a:r>
+              <a:rPr/>
+              <a:t>Czy porównanie stringów wystarczy?</a:t>
+            </a:r>
+            <a:endParaRPr/>
+          </a:p>
+        </p:txBody>
+      </p:sp>
+      <p:sp>
+        <p:nvSpPr>
+          <p:cNvPr id="1163313358" name="Symbol zastępczy zawartości 2"/>
           <p:cNvSpPr>
             <a:spLocks noGrp="1"/>
           </p:cNvSpPr>
@@ -4823,7 +5737,7 @@
         </p:nvSpPr>
         <p:spPr bwMode="auto">
           <a:xfrm flipH="0" flipV="0">
-            <a:off x="838198" y="1825624"/>
+            <a:off x="838197" y="1825623"/>
             <a:ext cx="10515600" cy="4351338"/>
           </a:xfrm>
         </p:spPr>
@@ -4836,10 +5750,98 @@
             <a:pPr>
               <a:defRPr/>
             </a:pPr>
-            <a:endParaRPr/>
-          </a:p>
-        </p:txBody>
-      </p:sp>
+            <a:r>
+              <a:rPr/>
+              <a:t>Czy zawsze dobrze wiemy, jak działa dana funkcja języka programowania?</a:t>
+            </a:r>
+            <a:endParaRPr/>
+          </a:p>
+          <a:p>
+            <a:pPr>
+              <a:defRPr/>
+            </a:pPr>
+            <a:r>
+              <a:rPr/>
+              <a:t>Nietrudno byłoby sobie wyobrazić sytuację, gdzie porównanie np. zawsze uznaje krótszy napis za mniejszy</a:t>
+            </a:r>
+            <a:endParaRPr/>
+          </a:p>
+          <a:p>
+            <a:pPr>
+              <a:defRPr/>
+            </a:pPr>
+            <a:r>
+              <a:rPr/>
+              <a:t>Jak sobie radzić takimi sytuacjami?</a:t>
+            </a:r>
+            <a:endParaRPr/>
+          </a:p>
+          <a:p>
+            <a:pPr>
+              <a:defRPr/>
+            </a:pPr>
+            <a:r>
+              <a:rPr/>
+              <a:t>Zazwyczaj da się napisać prosty test. Najlepiej jest wyszukać przypadek skrajny, aby mieć pewność co do wyniku.</a:t>
+            </a:r>
+            <a:endParaRPr/>
+          </a:p>
+          <a:p>
+            <a:pPr>
+              <a:defRPr/>
+            </a:pPr>
+            <a:r>
+              <a:rPr/>
+              <a:t>Czasem test jest szybszy niż szukanie w internecie</a:t>
+            </a:r>
+            <a:endParaRPr/>
+          </a:p>
+        </p:txBody>
+      </p:sp>
+      <p:pic>
+        <p:nvPicPr>
+          <p:cNvPr id="1878324452" name=""/>
+          <p:cNvPicPr>
+            <a:picLocks noChangeAspect="1"/>
+          </p:cNvPicPr>
+          <p:nvPr/>
+        </p:nvPicPr>
+        <p:blipFill>
+          <a:blip r:embed="rId4"/>
+          <a:stretch/>
+        </p:blipFill>
+        <p:spPr bwMode="auto">
+          <a:xfrm flipH="0" flipV="0">
+            <a:off x="9534247" y="4808737"/>
+            <a:ext cx="2526849" cy="1873049"/>
+          </a:xfrm>
+          <a:prstGeom prst="rect">
+            <a:avLst/>
+          </a:prstGeom>
+        </p:spPr>
+      </p:pic>
+      <p:pic>
+        <p:nvPicPr>
+          <p:cNvPr id="923654547" name=""/>
+          <p:cNvPicPr>
+            <a:picLocks noChangeAspect="1"/>
+          </p:cNvPicPr>
+          <p:nvPr/>
+        </p:nvPicPr>
+        <p:blipFill>
+          <a:blip r:embed="rId5"/>
+          <a:stretch/>
+        </p:blipFill>
+        <p:spPr bwMode="auto">
+          <a:xfrm flipH="0" flipV="0">
+            <a:off x="6095999" y="5927694"/>
+            <a:ext cx="3125329" cy="592167"/>
+          </a:xfrm>
+          <a:prstGeom prst="rect">
+            <a:avLst/>
+          </a:prstGeom>
+        </p:spPr>
+      </p:pic>
     </p:spTree>
   </p:cSld>
   <p:clrMapOvr>
@@ -4885,7 +5887,7 @@
       </p:grpSpPr>
       <p:sp>
         <p:nvSpPr>
-          <p:cNvPr id="1190907077" name="Tytuł 1"/>
+          <p:cNvPr id="889063880" name="Tytuł 1"/>
           <p:cNvSpPr>
             <a:spLocks noGrp="1"/>
           </p:cNvSpPr>
@@ -4893,31 +5895,1091 @@
             <p:ph type="title"/>
           </p:nvPr>
         </p:nvSpPr>
-        <p:spPr bwMode="auto"/>
-        <p:txBody>
-          <a:bodyPr/>
-          <a:lstStyle/>
-          <a:p>
-            <a:pPr>
-              <a:defRPr/>
-            </a:pPr>
-            <a:endParaRPr/>
-          </a:p>
-        </p:txBody>
-      </p:sp>
-      <p:sp>
-        <p:nvSpPr>
-          <p:cNvPr id="642647364" name="Symbol zastępczy zawartości 2"/>
-          <p:cNvSpPr>
-            <a:spLocks noGrp="1"/>
-          </p:cNvSpPr>
-          <p:nvPr>
-            <p:ph idx="1"/>
-          </p:nvPr>
+        <p:spPr bwMode="auto">
+          <a:xfrm>
+            <a:off x="838199" y="365124"/>
+            <a:ext cx="10515600" cy="1325562"/>
+          </a:xfrm>
+        </p:spPr>
+        <p:txBody>
+          <a:bodyPr/>
+          <a:lstStyle/>
+          <a:p>
+            <a:pPr>
+              <a:defRPr/>
+            </a:pPr>
+            <a:r>
+              <a:rPr/>
+              <a:t>Rozwiązanie</a:t>
+            </a:r>
+            <a:endParaRPr/>
+          </a:p>
+        </p:txBody>
+      </p:sp>
+      <p:sp>
+        <p:nvSpPr>
+          <p:cNvPr id="402899794" name=""/>
+          <p:cNvSpPr txBox="1"/>
+          <p:nvPr/>
         </p:nvSpPr>
         <p:spPr bwMode="auto">
           <a:xfrm flipH="0" flipV="0">
-            <a:off x="838198" y="1825624"/>
+            <a:off x="2224305" y="2866158"/>
+            <a:ext cx="7744105" cy="1189079"/>
+          </a:xfrm>
+          <a:prstGeom prst="rect">
+            <a:avLst/>
+          </a:prstGeom>
+          <a:noFill/>
+        </p:spPr>
+        <p:txBody>
+          <a:bodyPr vertOverflow="overflow" horzOverflow="overflow" vert="horz" wrap="square" lIns="91440" tIns="45720" rIns="91440" bIns="45720" numCol="1" spcCol="0" rtlCol="0" fromWordArt="0" anchor="t" anchorCtr="0" forceAA="0" upright="0" compatLnSpc="0">
+            <a:spAutoFit/>
+          </a:bodyPr>
+          <a:p>
+            <a:pPr algn="ctr">
+              <a:defRPr/>
+            </a:pPr>
+            <a:r>
+              <a:rPr sz="7200">
+                <a:latin typeface="Courier New"/>
+                <a:ea typeface="Courier New"/>
+                <a:cs typeface="Courier New"/>
+              </a:rPr>
+              <a:t>Loading...</a:t>
+            </a:r>
+            <a:endParaRPr sz="1400"/>
+          </a:p>
+        </p:txBody>
+      </p:sp>
+    </p:spTree>
+  </p:cSld>
+  <p:clrMapOvr>
+    <a:masterClrMapping/>
+  </p:clrMapOvr>
+  <mc:AlternateContent xmlns:mc="http://schemas.openxmlformats.org/markup-compatibility/2006">
+    <mc:Choice xmlns:p159="http://schemas.microsoft.com/office/powerpoint/2015/09/main" xmlns:p14="http://schemas.microsoft.com/office/powerpoint/2010/main" Requires="p159">
+      <p:transition p14:dur="2000" advClick="1"/>
+    </mc:Choice>
+    <mc:Fallback>
+      <p:transition advClick="1"/>
+    </mc:Fallback>
+  </mc:AlternateContent>
+</p:sld>
+</file>
+
+<file path=ppt/slides/slide12.xml><?xml version="1.0" encoding="utf-8"?>
+<p:sld xmlns:a="http://schemas.openxmlformats.org/drawingml/2006/main" xmlns:r="http://schemas.openxmlformats.org/officeDocument/2006/relationships" xmlns:p="http://schemas.openxmlformats.org/presentationml/2006/main" xmlns:m="http://schemas.openxmlformats.org/officeDocument/2006/math" xmlns:w="http://schemas.openxmlformats.org/wordprocessingml/2006/main" showMasterPhAnim="0" show="1">
+  <p:cSld name="">
+    <p:bg>
+      <p:bgPr shadeToTitle="0">
+        <a:blipFill>
+          <a:blip r:embed="rId3">
+            <a:alphaModFix amt="23000"/>
+          </a:blip>
+          <a:stretch/>
+        </a:blipFill>
+      </p:bgPr>
+    </p:bg>
+    <p:spTree>
+      <p:nvGrpSpPr>
+        <p:cNvPr id="1" name=""/>
+        <p:cNvGrpSpPr/>
+        <p:nvPr/>
+      </p:nvGrpSpPr>
+      <p:grpSpPr bwMode="auto">
+        <a:xfrm>
+          <a:off x="0" y="0"/>
+          <a:ext cx="0" cy="0"/>
+          <a:chOff x="0" y="0"/>
+          <a:chExt cx="0" cy="0"/>
+        </a:xfrm>
+      </p:grpSpPr>
+      <p:sp>
+        <p:nvSpPr>
+          <p:cNvPr id="800350863" name="Tytuł 1"/>
+          <p:cNvSpPr>
+            <a:spLocks noGrp="1"/>
+          </p:cNvSpPr>
+          <p:nvPr>
+            <p:ph type="title"/>
+          </p:nvPr>
+        </p:nvSpPr>
+        <p:spPr bwMode="auto">
+          <a:xfrm>
+            <a:off x="838199" y="365124"/>
+            <a:ext cx="10515600" cy="1325562"/>
+          </a:xfrm>
+        </p:spPr>
+        <p:txBody>
+          <a:bodyPr/>
+          <a:lstStyle/>
+          <a:p>
+            <a:pPr>
+              <a:defRPr/>
+            </a:pPr>
+            <a:r>
+              <a:rPr/>
+              <a:t>Rozwiązanie</a:t>
+            </a:r>
+            <a:endParaRPr/>
+          </a:p>
+        </p:txBody>
+      </p:sp>
+      <p:pic>
+        <p:nvPicPr>
+          <p:cNvPr id="421167146" name=""/>
+          <p:cNvPicPr>
+            <a:picLocks noChangeAspect="1"/>
+          </p:cNvPicPr>
+          <p:nvPr/>
+        </p:nvPicPr>
+        <p:blipFill>
+          <a:blip r:embed="rId4"/>
+          <a:stretch/>
+        </p:blipFill>
+        <p:spPr bwMode="auto">
+          <a:xfrm flipH="0" flipV="0">
+            <a:off x="2543082" y="1840266"/>
+            <a:ext cx="7709608" cy="3916346"/>
+          </a:xfrm>
+          <a:prstGeom prst="rect">
+            <a:avLst/>
+          </a:prstGeom>
+        </p:spPr>
+      </p:pic>
+    </p:spTree>
+  </p:cSld>
+  <p:clrMapOvr>
+    <a:masterClrMapping/>
+  </p:clrMapOvr>
+  <mc:AlternateContent xmlns:mc="http://schemas.openxmlformats.org/markup-compatibility/2006">
+    <mc:Choice xmlns:p159="http://schemas.microsoft.com/office/powerpoint/2015/09/main" xmlns:p14="http://schemas.microsoft.com/office/powerpoint/2010/main" Requires="p159">
+      <p:transition p14:dur="2000" advClick="1"/>
+    </mc:Choice>
+    <mc:Fallback>
+      <p:transition advClick="1"/>
+    </mc:Fallback>
+  </mc:AlternateContent>
+</p:sld>
+</file>
+
+<file path=ppt/slides/slide13.xml><?xml version="1.0" encoding="utf-8"?>
+<p:sld xmlns:a="http://schemas.openxmlformats.org/drawingml/2006/main" xmlns:r="http://schemas.openxmlformats.org/officeDocument/2006/relationships" xmlns:p="http://schemas.openxmlformats.org/presentationml/2006/main" xmlns:m="http://schemas.openxmlformats.org/officeDocument/2006/math" xmlns:w="http://schemas.openxmlformats.org/wordprocessingml/2006/main" showMasterPhAnim="0" show="1">
+  <p:cSld name="">
+    <p:bg>
+      <p:bgPr shadeToTitle="0">
+        <a:blipFill>
+          <a:blip r:embed="rId3">
+            <a:alphaModFix amt="23000"/>
+          </a:blip>
+          <a:stretch/>
+        </a:blipFill>
+      </p:bgPr>
+    </p:bg>
+    <p:spTree>
+      <p:nvGrpSpPr>
+        <p:cNvPr id="1" name=""/>
+        <p:cNvGrpSpPr/>
+        <p:nvPr/>
+      </p:nvGrpSpPr>
+      <p:grpSpPr bwMode="auto">
+        <a:xfrm>
+          <a:off x="0" y="0"/>
+          <a:ext cx="0" cy="0"/>
+          <a:chOff x="0" y="0"/>
+          <a:chExt cx="0" cy="0"/>
+        </a:xfrm>
+      </p:grpSpPr>
+      <p:sp>
+        <p:nvSpPr>
+          <p:cNvPr id="1690420137" name="Tytuł 1"/>
+          <p:cNvSpPr>
+            <a:spLocks noGrp="1"/>
+          </p:cNvSpPr>
+          <p:nvPr>
+            <p:ph type="title"/>
+          </p:nvPr>
+        </p:nvSpPr>
+        <p:spPr bwMode="auto"/>
+        <p:txBody>
+          <a:bodyPr/>
+          <a:lstStyle/>
+          <a:p>
+            <a:pPr>
+              <a:defRPr/>
+            </a:pPr>
+            <a:r>
+              <a:rPr/>
+              <a:t>Walczymy dalej</a:t>
+            </a:r>
+            <a:endParaRPr/>
+          </a:p>
+        </p:txBody>
+      </p:sp>
+      <p:pic>
+        <p:nvPicPr>
+          <p:cNvPr id="1974133764" name=""/>
+          <p:cNvPicPr>
+            <a:picLocks noChangeAspect="1"/>
+          </p:cNvPicPr>
+          <p:nvPr/>
+        </p:nvPicPr>
+        <p:blipFill>
+          <a:blip r:embed="rId4"/>
+          <a:stretch/>
+        </p:blipFill>
+        <p:spPr bwMode="auto">
+          <a:xfrm>
+            <a:off x="480873" y="1758155"/>
+            <a:ext cx="7439024" cy="4486275"/>
+          </a:xfrm>
+          <a:prstGeom prst="rect">
+            <a:avLst/>
+          </a:prstGeom>
+        </p:spPr>
+      </p:pic>
+      <p:pic>
+        <p:nvPicPr>
+          <p:cNvPr id="211236759" name=""/>
+          <p:cNvPicPr>
+            <a:picLocks noChangeAspect="1"/>
+          </p:cNvPicPr>
+          <p:nvPr/>
+        </p:nvPicPr>
+        <p:blipFill>
+          <a:blip r:embed="rId5"/>
+          <a:stretch/>
+        </p:blipFill>
+        <p:spPr bwMode="auto">
+          <a:xfrm flipH="0" flipV="0">
+            <a:off x="8136338" y="2182426"/>
+            <a:ext cx="3776014" cy="3784014"/>
+          </a:xfrm>
+          <a:prstGeom prst="rect">
+            <a:avLst/>
+          </a:prstGeom>
+        </p:spPr>
+      </p:pic>
+    </p:spTree>
+  </p:cSld>
+  <p:clrMapOvr>
+    <a:masterClrMapping/>
+  </p:clrMapOvr>
+  <mc:AlternateContent xmlns:mc="http://schemas.openxmlformats.org/markup-compatibility/2006">
+    <mc:Choice xmlns:p159="http://schemas.microsoft.com/office/powerpoint/2015/09/main" xmlns:p14="http://schemas.microsoft.com/office/powerpoint/2010/main" Requires="p159">
+      <p:transition p14:dur="2000" advClick="1"/>
+    </mc:Choice>
+    <mc:Fallback>
+      <p:transition advClick="1"/>
+    </mc:Fallback>
+  </mc:AlternateContent>
+</p:sld>
+</file>
+
+<file path=ppt/slides/slide14.xml><?xml version="1.0" encoding="utf-8"?>
+<p:sld xmlns:a="http://schemas.openxmlformats.org/drawingml/2006/main" xmlns:r="http://schemas.openxmlformats.org/officeDocument/2006/relationships" xmlns:p="http://schemas.openxmlformats.org/presentationml/2006/main" xmlns:m="http://schemas.openxmlformats.org/officeDocument/2006/math" xmlns:w="http://schemas.openxmlformats.org/wordprocessingml/2006/main" showMasterPhAnim="0" show="1">
+  <p:cSld name="">
+    <p:bg>
+      <p:bgPr shadeToTitle="0">
+        <a:blipFill>
+          <a:blip r:embed="rId3">
+            <a:alphaModFix amt="23000"/>
+          </a:blip>
+          <a:stretch/>
+        </a:blipFill>
+      </p:bgPr>
+    </p:bg>
+    <p:spTree>
+      <p:nvGrpSpPr>
+        <p:cNvPr id="1" name=""/>
+        <p:cNvGrpSpPr/>
+        <p:nvPr/>
+      </p:nvGrpSpPr>
+      <p:grpSpPr bwMode="auto">
+        <a:xfrm>
+          <a:off x="0" y="0"/>
+          <a:ext cx="0" cy="0"/>
+          <a:chOff x="0" y="0"/>
+          <a:chExt cx="0" cy="0"/>
+        </a:xfrm>
+      </p:grpSpPr>
+      <p:sp>
+        <p:nvSpPr>
+          <p:cNvPr id="1958746300" name="Tytuł 1"/>
+          <p:cNvSpPr>
+            <a:spLocks noGrp="1"/>
+          </p:cNvSpPr>
+          <p:nvPr>
+            <p:ph type="title"/>
+          </p:nvPr>
+        </p:nvSpPr>
+        <p:spPr bwMode="auto"/>
+        <p:txBody>
+          <a:bodyPr/>
+          <a:lstStyle/>
+          <a:p>
+            <a:pPr>
+              <a:defRPr/>
+            </a:pPr>
+            <a:r>
+              <a:rPr/>
+              <a:t>Już to widzieliśmy</a:t>
+            </a:r>
+            <a:endParaRPr/>
+          </a:p>
+        </p:txBody>
+      </p:sp>
+      <p:sp>
+        <p:nvSpPr>
+          <p:cNvPr id="417518393" name="Symbol zastępczy zawartości 2"/>
+          <p:cNvSpPr>
+            <a:spLocks noGrp="1"/>
+          </p:cNvSpPr>
+          <p:nvPr>
+            <p:ph idx="1"/>
+          </p:nvPr>
+        </p:nvSpPr>
+        <p:spPr bwMode="auto">
+          <a:xfrm flipH="0" flipV="0">
+            <a:off x="838197" y="1825623"/>
+            <a:ext cx="10515600" cy="4351338"/>
+          </a:xfrm>
+        </p:spPr>
+        <p:txBody>
+          <a:bodyPr vertOverflow="overflow" horzOverflow="overflow" vert="horz" wrap="square" lIns="91440" tIns="45720" rIns="91440" bIns="45720" numCol="1" spcCol="0" rtlCol="0" fromWordArt="0" anchor="t" anchorCtr="0" forceAA="0" upright="0" compatLnSpc="0">
+            <a:normAutofit fontScale="95000" lnSpcReduction="1000"/>
+          </a:bodyPr>
+          <a:lstStyle/>
+          <a:p>
+            <a:pPr>
+              <a:defRPr/>
+            </a:pPr>
+            <a:r>
+              <a:rPr/>
+              <a:t>Znowu obowiązują nas ograniczenia odnośnie elementów języka, które możemy wykorzystać</a:t>
+            </a:r>
+            <a:endParaRPr/>
+          </a:p>
+          <a:p>
+            <a:pPr>
+              <a:defRPr/>
+            </a:pPr>
+            <a:r>
+              <a:rPr/>
+              <a:t>Przypomnijmy, są to:</a:t>
+            </a:r>
+            <a:endParaRPr/>
+          </a:p>
+          <a:p>
+            <a:pPr lvl="1">
+              <a:defRPr/>
+            </a:pPr>
+            <a:r>
+              <a:rPr/>
+              <a:t>Operacje arytmetyczne</a:t>
+            </a:r>
+            <a:endParaRPr/>
+          </a:p>
+          <a:p>
+            <a:pPr lvl="1">
+              <a:defRPr/>
+            </a:pPr>
+            <a:r>
+              <a:rPr/>
+              <a:t>Porównania</a:t>
+            </a:r>
+            <a:endParaRPr/>
+          </a:p>
+          <a:p>
+            <a:pPr lvl="1">
+              <a:defRPr/>
+            </a:pPr>
+            <a:r>
+              <a:rPr/>
+              <a:t>Zmienne (pojedyncze oraz tablice)</a:t>
+            </a:r>
+            <a:endParaRPr/>
+          </a:p>
+          <a:p>
+            <a:pPr lvl="1">
+              <a:defRPr/>
+            </a:pPr>
+            <a:r>
+              <a:rPr/>
+              <a:t>if, else, while, for (instrukcje sterujące)</a:t>
+            </a:r>
+            <a:endParaRPr/>
+          </a:p>
+          <a:p>
+            <a:pPr lvl="1">
+              <a:defRPr/>
+            </a:pPr>
+            <a:r>
+              <a:rPr/>
+              <a:t>Samodzielnie napisane funkcje</a:t>
+            </a:r>
+            <a:endParaRPr/>
+          </a:p>
+          <a:p>
+            <a:pPr lvl="0">
+              <a:defRPr/>
+            </a:pPr>
+            <a:r>
+              <a:rPr/>
+              <a:t>Tutaj dodatkowo możemy użyć funkcji czy_mniejszy(). Zakładamy, że jest ona już napisana i nie musimy jej ręcznie definiować.</a:t>
+            </a:r>
+            <a:endParaRPr/>
+          </a:p>
+        </p:txBody>
+      </p:sp>
+    </p:spTree>
+  </p:cSld>
+  <p:clrMapOvr>
+    <a:masterClrMapping/>
+  </p:clrMapOvr>
+  <mc:AlternateContent xmlns:mc="http://schemas.openxmlformats.org/markup-compatibility/2006">
+    <mc:Choice xmlns:p159="http://schemas.microsoft.com/office/powerpoint/2015/09/main" xmlns:p14="http://schemas.microsoft.com/office/powerpoint/2010/main" Requires="p159">
+      <p:transition p14:dur="2000" advClick="1"/>
+    </mc:Choice>
+    <mc:Fallback>
+      <p:transition advClick="1"/>
+    </mc:Fallback>
+  </mc:AlternateContent>
+</p:sld>
+</file>
+
+<file path=ppt/slides/slide15.xml><?xml version="1.0" encoding="utf-8"?>
+<p:sld xmlns:a="http://schemas.openxmlformats.org/drawingml/2006/main" xmlns:r="http://schemas.openxmlformats.org/officeDocument/2006/relationships" xmlns:p="http://schemas.openxmlformats.org/presentationml/2006/main" xmlns:m="http://schemas.openxmlformats.org/officeDocument/2006/math" xmlns:w="http://schemas.openxmlformats.org/wordprocessingml/2006/main" showMasterPhAnim="0" show="1">
+  <p:cSld name="">
+    <p:bg>
+      <p:bgPr shadeToTitle="0">
+        <a:blipFill>
+          <a:blip r:embed="rId3">
+            <a:alphaModFix amt="23000"/>
+          </a:blip>
+          <a:stretch/>
+        </a:blipFill>
+      </p:bgPr>
+    </p:bg>
+    <p:spTree>
+      <p:nvGrpSpPr>
+        <p:cNvPr id="1" name=""/>
+        <p:cNvGrpSpPr/>
+        <p:nvPr/>
+      </p:nvGrpSpPr>
+      <p:grpSpPr bwMode="auto">
+        <a:xfrm>
+          <a:off x="0" y="0"/>
+          <a:ext cx="0" cy="0"/>
+          <a:chOff x="0" y="0"/>
+          <a:chExt cx="0" cy="0"/>
+        </a:xfrm>
+      </p:grpSpPr>
+      <p:sp>
+        <p:nvSpPr>
+          <p:cNvPr id="2054237234" name="Tytuł 1"/>
+          <p:cNvSpPr>
+            <a:spLocks noGrp="1"/>
+          </p:cNvSpPr>
+          <p:nvPr>
+            <p:ph type="title"/>
+          </p:nvPr>
+        </p:nvSpPr>
+        <p:spPr bwMode="auto"/>
+        <p:txBody>
+          <a:bodyPr/>
+          <a:lstStyle/>
+          <a:p>
+            <a:pPr>
+              <a:defRPr/>
+            </a:pPr>
+            <a:r>
+              <a:rPr/>
+              <a:t>Wskazówki</a:t>
+            </a:r>
+            <a:endParaRPr/>
+          </a:p>
+        </p:txBody>
+      </p:sp>
+      <p:sp>
+        <p:nvSpPr>
+          <p:cNvPr id="1944357532" name="Symbol zastępczy zawartości 2"/>
+          <p:cNvSpPr>
+            <a:spLocks noGrp="1"/>
+          </p:cNvSpPr>
+          <p:nvPr>
+            <p:ph idx="1"/>
+          </p:nvPr>
+        </p:nvSpPr>
+        <p:spPr bwMode="auto">
+          <a:xfrm flipH="0" flipV="0">
+            <a:off x="838197" y="1825623"/>
+            <a:ext cx="10515600" cy="4351338"/>
+          </a:xfrm>
+        </p:spPr>
+        <p:txBody>
+          <a:bodyPr vertOverflow="overflow" horzOverflow="overflow" vert="horz" wrap="square" lIns="91440" tIns="45720" rIns="91440" bIns="45720" numCol="1" spcCol="0" rtlCol="0" fromWordArt="0" anchor="t" anchorCtr="0" forceAA="0" upright="0" compatLnSpc="0">
+            <a:normAutofit/>
+          </a:bodyPr>
+          <a:lstStyle/>
+          <a:p>
+            <a:pPr>
+              <a:defRPr/>
+            </a:pPr>
+            <a:r>
+              <a:rPr/>
+              <a:t>Zadanie maturalne nie być napisane przesadnie efektywnie</a:t>
+            </a:r>
+            <a:endParaRPr/>
+          </a:p>
+          <a:p>
+            <a:pPr>
+              <a:defRPr/>
+            </a:pPr>
+            <a:r>
+              <a:rPr/>
+              <a:t>Priorytetem jest dobry wynik i krótki czas pisania kodu</a:t>
+            </a:r>
+            <a:endParaRPr/>
+          </a:p>
+          <a:p>
+            <a:pPr>
+              <a:defRPr/>
+            </a:pPr>
+            <a:r>
+              <a:rPr/>
+              <a:t>Często istnieje „sprytniejsze” rozwiązanie o mniejszej złożoności obliczeniowej – to jest jednak pułapka. Szukanie tego rozwiązania potrwa zbyt długo.</a:t>
+            </a:r>
+            <a:endParaRPr/>
+          </a:p>
+          <a:p>
+            <a:pPr>
+              <a:defRPr/>
+            </a:pPr>
+            <a:r>
+              <a:rPr/>
+              <a:t>Szukając odpowiedzi, należy zwrócić uwagę na to, czego dokładnie dotyczy pytanie – tutaj mamy znaleźć numery sufiksów uporządkowanych alfabetycznuie</a:t>
+            </a:r>
+            <a:endParaRPr/>
+          </a:p>
+          <a:p>
+            <a:pPr>
+              <a:defRPr/>
+            </a:pPr>
+            <a:endParaRPr/>
+          </a:p>
+        </p:txBody>
+      </p:sp>
+    </p:spTree>
+  </p:cSld>
+  <p:clrMapOvr>
+    <a:masterClrMapping/>
+  </p:clrMapOvr>
+  <mc:AlternateContent xmlns:mc="http://schemas.openxmlformats.org/markup-compatibility/2006">
+    <mc:Choice xmlns:p159="http://schemas.microsoft.com/office/powerpoint/2015/09/main" xmlns:p14="http://schemas.microsoft.com/office/powerpoint/2010/main" Requires="p159">
+      <p:transition p14:dur="2000" advClick="1"/>
+    </mc:Choice>
+    <mc:Fallback>
+      <p:transition advClick="1"/>
+    </mc:Fallback>
+  </mc:AlternateContent>
+</p:sld>
+</file>
+
+<file path=ppt/slides/slide16.xml><?xml version="1.0" encoding="utf-8"?>
+<p:sld xmlns:a="http://schemas.openxmlformats.org/drawingml/2006/main" xmlns:r="http://schemas.openxmlformats.org/officeDocument/2006/relationships" xmlns:p="http://schemas.openxmlformats.org/presentationml/2006/main" xmlns:m="http://schemas.openxmlformats.org/officeDocument/2006/math" xmlns:w="http://schemas.openxmlformats.org/wordprocessingml/2006/main" showMasterPhAnim="0" show="1">
+  <p:cSld name="">
+    <p:bg>
+      <p:bgPr shadeToTitle="0">
+        <a:blipFill>
+          <a:blip r:embed="rId3">
+            <a:alphaModFix amt="23000"/>
+          </a:blip>
+          <a:stretch/>
+        </a:blipFill>
+      </p:bgPr>
+    </p:bg>
+    <p:spTree>
+      <p:nvGrpSpPr>
+        <p:cNvPr id="1" name=""/>
+        <p:cNvGrpSpPr/>
+        <p:nvPr/>
+      </p:nvGrpSpPr>
+      <p:grpSpPr bwMode="auto">
+        <a:xfrm>
+          <a:off x="0" y="0"/>
+          <a:ext cx="0" cy="0"/>
+          <a:chOff x="0" y="0"/>
+          <a:chExt cx="0" cy="0"/>
+        </a:xfrm>
+      </p:grpSpPr>
+      <p:sp>
+        <p:nvSpPr>
+          <p:cNvPr id="654304202" name="Tytuł 1"/>
+          <p:cNvSpPr>
+            <a:spLocks noGrp="1"/>
+          </p:cNvSpPr>
+          <p:nvPr>
+            <p:ph type="title"/>
+          </p:nvPr>
+        </p:nvSpPr>
+        <p:spPr bwMode="auto"/>
+        <p:txBody>
+          <a:bodyPr/>
+          <a:lstStyle/>
+          <a:p>
+            <a:pPr>
+              <a:defRPr/>
+            </a:pPr>
+            <a:r>
+              <a:rPr/>
+              <a:t>Wskazówki II</a:t>
+            </a:r>
+            <a:endParaRPr/>
+          </a:p>
+        </p:txBody>
+      </p:sp>
+      <p:sp>
+        <p:nvSpPr>
+          <p:cNvPr id="853198165" name="Symbol zastępczy zawartości 2"/>
+          <p:cNvSpPr>
+            <a:spLocks noGrp="1"/>
+          </p:cNvSpPr>
+          <p:nvPr>
+            <p:ph idx="1"/>
+          </p:nvPr>
+        </p:nvSpPr>
+        <p:spPr bwMode="auto">
+          <a:xfrm flipH="0" flipV="0">
+            <a:off x="838197" y="1825623"/>
+            <a:ext cx="10515600" cy="4351338"/>
+          </a:xfrm>
+        </p:spPr>
+        <p:txBody>
+          <a:bodyPr vertOverflow="overflow" horzOverflow="overflow" vert="horz" wrap="square" lIns="91440" tIns="45720" rIns="91440" bIns="45720" numCol="1" spcCol="0" rtlCol="0" fromWordArt="0" anchor="t" anchorCtr="0" forceAA="0" upright="0" compatLnSpc="0">
+            <a:normAutofit/>
+          </a:bodyPr>
+          <a:lstStyle/>
+          <a:p>
+            <a:pPr>
+              <a:defRPr/>
+            </a:pPr>
+            <a:r>
+              <a:rPr/>
+              <a:t>Szukając odpowiedzi, należy zwrócić uwagę na to, czego dokładnie dotyczy pytanie – tutaj mamy znaleźć pozycję każdego sufiksu, jeśli uporządkowalibyśmy je alfabetycznie</a:t>
+            </a:r>
+            <a:endParaRPr/>
+          </a:p>
+          <a:p>
+            <a:pPr>
+              <a:defRPr/>
+            </a:pPr>
+            <a:r>
+              <a:rPr/>
+              <a:t>We wcześniejszej części arkusza jest podpowiedź!</a:t>
+            </a:r>
+            <a:endParaRPr/>
+          </a:p>
+          <a:p>
+            <a:pPr>
+              <a:defRPr/>
+            </a:pPr>
+            <a:r>
+              <a:rPr/>
+              <a:t>Czyli mówiąc prościej, indeks to liczba wyrażająca...</a:t>
+            </a:r>
+            <a:endParaRPr/>
+          </a:p>
+          <a:p>
+            <a:pPr>
+              <a:defRPr/>
+            </a:pPr>
+            <a:endParaRPr/>
+          </a:p>
+        </p:txBody>
+      </p:sp>
+      <p:pic>
+        <p:nvPicPr>
+          <p:cNvPr id="749953605" name=""/>
+          <p:cNvPicPr>
+            <a:picLocks noChangeAspect="1"/>
+          </p:cNvPicPr>
+          <p:nvPr/>
+        </p:nvPicPr>
+        <p:blipFill>
+          <a:blip r:embed="rId4"/>
+          <a:stretch/>
+        </p:blipFill>
+        <p:spPr bwMode="auto">
+          <a:xfrm flipH="0" flipV="0">
+            <a:off x="3458592" y="4300828"/>
+            <a:ext cx="4902159" cy="2301013"/>
+          </a:xfrm>
+          <a:prstGeom prst="rect">
+            <a:avLst/>
+          </a:prstGeom>
+        </p:spPr>
+      </p:pic>
+    </p:spTree>
+  </p:cSld>
+  <p:clrMapOvr>
+    <a:masterClrMapping/>
+  </p:clrMapOvr>
+  <mc:AlternateContent xmlns:mc="http://schemas.openxmlformats.org/markup-compatibility/2006">
+    <mc:Choice xmlns:p159="http://schemas.microsoft.com/office/powerpoint/2015/09/main" xmlns:p14="http://schemas.microsoft.com/office/powerpoint/2010/main" Requires="p159">
+      <p:transition p14:dur="2000" advClick="1"/>
+    </mc:Choice>
+    <mc:Fallback>
+      <p:transition advClick="1"/>
+    </mc:Fallback>
+  </mc:AlternateContent>
+</p:sld>
+</file>
+
+<file path=ppt/slides/slide17.xml><?xml version="1.0" encoding="utf-8"?>
+<p:sld xmlns:a="http://schemas.openxmlformats.org/drawingml/2006/main" xmlns:r="http://schemas.openxmlformats.org/officeDocument/2006/relationships" xmlns:p="http://schemas.openxmlformats.org/presentationml/2006/main" xmlns:m="http://schemas.openxmlformats.org/officeDocument/2006/math" xmlns:w="http://schemas.openxmlformats.org/wordprocessingml/2006/main" showMasterPhAnim="0" show="1">
+  <p:cSld name="">
+    <p:bg>
+      <p:bgPr shadeToTitle="0">
+        <a:blipFill>
+          <a:blip r:embed="rId3">
+            <a:alphaModFix amt="23000"/>
+          </a:blip>
+          <a:stretch/>
+        </a:blipFill>
+      </p:bgPr>
+    </p:bg>
+    <p:spTree>
+      <p:nvGrpSpPr>
+        <p:cNvPr id="1" name=""/>
+        <p:cNvGrpSpPr/>
+        <p:nvPr/>
+      </p:nvGrpSpPr>
+      <p:grpSpPr bwMode="auto">
+        <a:xfrm>
+          <a:off x="0" y="0"/>
+          <a:ext cx="0" cy="0"/>
+          <a:chOff x="0" y="0"/>
+          <a:chExt cx="0" cy="0"/>
+        </a:xfrm>
+      </p:grpSpPr>
+      <p:sp>
+        <p:nvSpPr>
+          <p:cNvPr id="1951748518" name="Tytuł 1"/>
+          <p:cNvSpPr>
+            <a:spLocks noGrp="1"/>
+          </p:cNvSpPr>
+          <p:nvPr>
+            <p:ph type="title"/>
+          </p:nvPr>
+        </p:nvSpPr>
+        <p:spPr bwMode="auto"/>
+        <p:txBody>
+          <a:bodyPr/>
+          <a:lstStyle/>
+          <a:p>
+            <a:pPr>
+              <a:defRPr/>
+            </a:pPr>
+            <a:r>
+              <a:rPr/>
+              <a:t>Wskazówki II</a:t>
+            </a:r>
+            <a:endParaRPr/>
+          </a:p>
+        </p:txBody>
+      </p:sp>
+      <p:sp>
+        <p:nvSpPr>
+          <p:cNvPr id="226975541" name="Symbol zastępczy zawartości 2"/>
+          <p:cNvSpPr>
+            <a:spLocks noGrp="1"/>
+          </p:cNvSpPr>
+          <p:nvPr>
+            <p:ph idx="1"/>
+          </p:nvPr>
+        </p:nvSpPr>
+        <p:spPr bwMode="auto">
+          <a:xfrm flipH="0" flipV="0">
+            <a:off x="838197" y="1825623"/>
+            <a:ext cx="10515600" cy="4351338"/>
+          </a:xfrm>
+        </p:spPr>
+        <p:txBody>
+          <a:bodyPr vertOverflow="overflow" horzOverflow="overflow" vert="horz" wrap="square" lIns="91440" tIns="45720" rIns="91440" bIns="45720" numCol="1" spcCol="0" rtlCol="0" fromWordArt="0" anchor="t" anchorCtr="0" forceAA="0" upright="0" compatLnSpc="0">
+            <a:normAutofit/>
+          </a:bodyPr>
+          <a:lstStyle/>
+          <a:p>
+            <a:pPr>
+              <a:defRPr/>
+            </a:pPr>
+            <a:r>
+              <a:rPr lang="pl-PL" sz="2800" b="0" i="0" u="none" strike="noStrike" cap="none" spc="0">
+                <a:solidFill>
+                  <a:schemeClr val="tx1"/>
+                </a:solidFill>
+                <a:latin typeface="+mn-lt"/>
+                <a:ea typeface="+mn-ea"/>
+                <a:cs typeface="+mn-cs"/>
+              </a:rPr>
+              <a:t>Szukając odpowiedzi, należy zwrócić uwagę na to, czego dokładnie dotyczy pytanie – tutaj mamy znaleźć pozycję każdego sufiksu, jeśli uporządkowalibyśmy je alfabetycznie</a:t>
+            </a:r>
+            <a:endParaRPr sz="2800"/>
+          </a:p>
+          <a:p>
+            <a:pPr>
+              <a:defRPr/>
+            </a:pPr>
+            <a:r>
+              <a:rPr lang="pl-PL" sz="2800" b="0" i="0" u="none" strike="noStrike" cap="none" spc="0">
+                <a:solidFill>
+                  <a:schemeClr val="tx1"/>
+                </a:solidFill>
+                <a:latin typeface="+mn-lt"/>
+                <a:ea typeface="+mn-ea"/>
+                <a:cs typeface="+mn-cs"/>
+              </a:rPr>
+              <a:t>We wcześniejszej części arkusza jest podpowiedź!</a:t>
+            </a:r>
+            <a:endParaRPr sz="2800"/>
+          </a:p>
+          <a:p>
+            <a:pPr>
+              <a:defRPr/>
+            </a:pPr>
+            <a:r>
+              <a:rPr lang="pl-PL" sz="2800" b="0" i="0" u="none" strike="noStrike" cap="none" spc="0">
+                <a:solidFill>
+                  <a:schemeClr val="tx1"/>
+                </a:solidFill>
+                <a:latin typeface="+mn-lt"/>
+                <a:ea typeface="+mn-ea"/>
+                <a:cs typeface="+mn-cs"/>
+              </a:rPr>
+              <a:t>Czyli mówiąc prościej, indeks sufiksu w tablicy to liczba wyrażająca</a:t>
+            </a:r>
+            <a:r>
+              <a:rPr/>
+              <a:t>...</a:t>
+            </a:r>
+            <a:endParaRPr/>
+          </a:p>
+          <a:p>
+            <a:pPr>
+              <a:defRPr/>
+            </a:pPr>
+            <a:r>
+              <a:rPr/>
+              <a:t>...liczbę sufiksów w słowie, które </a:t>
+            </a:r>
+            <a:r>
+              <a:rPr b="1"/>
+              <a:t>są mniejsze</a:t>
+            </a:r>
+            <a:r>
+              <a:rPr/>
+              <a:t> od zadanego.</a:t>
+            </a:r>
+            <a:endParaRPr/>
+          </a:p>
+          <a:p>
+            <a:pPr>
+              <a:defRPr/>
+            </a:pPr>
+            <a:endParaRPr/>
+          </a:p>
+        </p:txBody>
+      </p:sp>
+    </p:spTree>
+  </p:cSld>
+  <p:clrMapOvr>
+    <a:masterClrMapping/>
+  </p:clrMapOvr>
+  <mc:AlternateContent xmlns:mc="http://schemas.openxmlformats.org/markup-compatibility/2006">
+    <mc:Choice xmlns:p159="http://schemas.microsoft.com/office/powerpoint/2015/09/main" xmlns:p14="http://schemas.microsoft.com/office/powerpoint/2010/main" Requires="p159">
+      <p:transition p14:dur="2000" advClick="1"/>
+    </mc:Choice>
+    <mc:Fallback>
+      <p:transition advClick="1"/>
+    </mc:Fallback>
+  </mc:AlternateContent>
+</p:sld>
+</file>
+
+<file path=ppt/slides/slide18.xml><?xml version="1.0" encoding="utf-8"?>
+<p:sld xmlns:a="http://schemas.openxmlformats.org/drawingml/2006/main" xmlns:r="http://schemas.openxmlformats.org/officeDocument/2006/relationships" xmlns:p="http://schemas.openxmlformats.org/presentationml/2006/main" xmlns:m="http://schemas.openxmlformats.org/officeDocument/2006/math" xmlns:w="http://schemas.openxmlformats.org/wordprocessingml/2006/main" showMasterPhAnim="0" show="1">
+  <p:cSld name="">
+    <p:bg>
+      <p:bgPr shadeToTitle="0">
+        <a:blipFill>
+          <a:blip r:embed="rId3">
+            <a:alphaModFix amt="23000"/>
+          </a:blip>
+          <a:stretch/>
+        </a:blipFill>
+      </p:bgPr>
+    </p:bg>
+    <p:spTree>
+      <p:nvGrpSpPr>
+        <p:cNvPr id="1" name=""/>
+        <p:cNvGrpSpPr/>
+        <p:nvPr/>
+      </p:nvGrpSpPr>
+      <p:grpSpPr bwMode="auto">
+        <a:xfrm>
+          <a:off x="0" y="0"/>
+          <a:ext cx="0" cy="0"/>
+          <a:chOff x="0" y="0"/>
+          <a:chExt cx="0" cy="0"/>
+        </a:xfrm>
+      </p:grpSpPr>
+      <p:sp>
+        <p:nvSpPr>
+          <p:cNvPr id="1628430094" name="Tytuł 1"/>
+          <p:cNvSpPr>
+            <a:spLocks noGrp="1"/>
+          </p:cNvSpPr>
+          <p:nvPr>
+            <p:ph type="title"/>
+          </p:nvPr>
+        </p:nvSpPr>
+        <p:spPr bwMode="auto">
+          <a:xfrm>
+            <a:off x="838199" y="365124"/>
+            <a:ext cx="10515600" cy="1325562"/>
+          </a:xfrm>
+        </p:spPr>
+        <p:txBody>
+          <a:bodyPr/>
+          <a:lstStyle/>
+          <a:p>
+            <a:pPr>
+              <a:defRPr/>
+            </a:pPr>
+            <a:r>
+              <a:rPr/>
+              <a:t>Rozwiązanie</a:t>
+            </a:r>
+            <a:endParaRPr/>
+          </a:p>
+        </p:txBody>
+      </p:sp>
+      <p:sp>
+        <p:nvSpPr>
+          <p:cNvPr id="1043293116" name=""/>
+          <p:cNvSpPr txBox="1"/>
+          <p:nvPr/>
+        </p:nvSpPr>
+        <p:spPr bwMode="auto">
+          <a:xfrm flipH="0" flipV="0">
+            <a:off x="2224305" y="2866158"/>
+            <a:ext cx="7744105" cy="1189079"/>
+          </a:xfrm>
+          <a:prstGeom prst="rect">
+            <a:avLst/>
+          </a:prstGeom>
+          <a:noFill/>
+        </p:spPr>
+        <p:txBody>
+          <a:bodyPr vertOverflow="overflow" horzOverflow="overflow" vert="horz" wrap="square" lIns="91440" tIns="45720" rIns="91440" bIns="45720" numCol="1" spcCol="0" rtlCol="0" fromWordArt="0" anchor="t" anchorCtr="0" forceAA="0" upright="0" compatLnSpc="0">
+            <a:spAutoFit/>
+          </a:bodyPr>
+          <a:p>
+            <a:pPr algn="ctr">
+              <a:defRPr/>
+            </a:pPr>
+            <a:r>
+              <a:rPr sz="7200">
+                <a:latin typeface="Courier New"/>
+                <a:ea typeface="Courier New"/>
+                <a:cs typeface="Courier New"/>
+              </a:rPr>
+              <a:t>Loading...</a:t>
+            </a:r>
+            <a:endParaRPr sz="1400"/>
+          </a:p>
+        </p:txBody>
+      </p:sp>
+    </p:spTree>
+  </p:cSld>
+  <p:clrMapOvr>
+    <a:masterClrMapping/>
+  </p:clrMapOvr>
+  <mc:AlternateContent xmlns:mc="http://schemas.openxmlformats.org/markup-compatibility/2006">
+    <mc:Choice xmlns:p159="http://schemas.microsoft.com/office/powerpoint/2015/09/main" xmlns:p14="http://schemas.microsoft.com/office/powerpoint/2010/main" Requires="p159">
+      <p:transition p14:dur="2000" advClick="1"/>
+    </mc:Choice>
+    <mc:Fallback>
+      <p:transition advClick="1"/>
+    </mc:Fallback>
+  </mc:AlternateContent>
+</p:sld>
+</file>
+
+<file path=ppt/slides/slide19.xml><?xml version="1.0" encoding="utf-8"?>
+<p:sld xmlns:a="http://schemas.openxmlformats.org/drawingml/2006/main" xmlns:r="http://schemas.openxmlformats.org/officeDocument/2006/relationships" xmlns:p="http://schemas.openxmlformats.org/presentationml/2006/main" xmlns:m="http://schemas.openxmlformats.org/officeDocument/2006/math" xmlns:w="http://schemas.openxmlformats.org/wordprocessingml/2006/main" showMasterPhAnim="0" show="1">
+  <p:cSld name="">
+    <p:bg>
+      <p:bgPr shadeToTitle="0">
+        <a:blipFill>
+          <a:blip r:embed="rId3">
+            <a:alphaModFix amt="23000"/>
+          </a:blip>
+          <a:stretch/>
+        </a:blipFill>
+      </p:bgPr>
+    </p:bg>
+    <p:spTree>
+      <p:nvGrpSpPr>
+        <p:cNvPr id="1" name=""/>
+        <p:cNvGrpSpPr/>
+        <p:nvPr/>
+      </p:nvGrpSpPr>
+      <p:grpSpPr bwMode="auto">
+        <a:xfrm>
+          <a:off x="0" y="0"/>
+          <a:ext cx="0" cy="0"/>
+          <a:chOff x="0" y="0"/>
+          <a:chExt cx="0" cy="0"/>
+        </a:xfrm>
+      </p:grpSpPr>
+      <p:sp>
+        <p:nvSpPr>
+          <p:cNvPr id="1831850947" name="Tytuł 1"/>
+          <p:cNvSpPr>
+            <a:spLocks noGrp="1"/>
+          </p:cNvSpPr>
+          <p:nvPr>
+            <p:ph type="title"/>
+          </p:nvPr>
+        </p:nvSpPr>
+        <p:spPr bwMode="auto"/>
+        <p:txBody>
+          <a:bodyPr/>
+          <a:lstStyle/>
+          <a:p>
+            <a:pPr>
+              <a:defRPr/>
+            </a:pPr>
+            <a:endParaRPr/>
+          </a:p>
+        </p:txBody>
+      </p:sp>
+      <p:sp>
+        <p:nvSpPr>
+          <p:cNvPr id="2004001255" name="Symbol zastępczy zawartości 2"/>
+          <p:cNvSpPr>
+            <a:spLocks noGrp="1"/>
+          </p:cNvSpPr>
+          <p:nvPr>
+            <p:ph idx="1"/>
+          </p:nvPr>
+        </p:nvSpPr>
+        <p:spPr bwMode="auto">
+          <a:xfrm flipH="0" flipV="0">
+            <a:off x="838197" y="1825623"/>
             <a:ext cx="10515600" cy="4351338"/>
           </a:xfrm>
         </p:spPr>
@@ -5087,6 +7149,194 @@
           </a:prstGeom>
         </p:spPr>
       </p:pic>
+    </p:spTree>
+  </p:cSld>
+  <p:clrMapOvr>
+    <a:masterClrMapping/>
+  </p:clrMapOvr>
+  <mc:AlternateContent xmlns:mc="http://schemas.openxmlformats.org/markup-compatibility/2006">
+    <mc:Choice xmlns:p159="http://schemas.microsoft.com/office/powerpoint/2015/09/main" xmlns:p14="http://schemas.microsoft.com/office/powerpoint/2010/main" Requires="p159">
+      <p:transition p14:dur="2000" advClick="1"/>
+    </mc:Choice>
+    <mc:Fallback>
+      <p:transition advClick="1"/>
+    </mc:Fallback>
+  </mc:AlternateContent>
+</p:sld>
+</file>
+
+<file path=ppt/slides/slide20.xml><?xml version="1.0" encoding="utf-8"?>
+<p:sld xmlns:a="http://schemas.openxmlformats.org/drawingml/2006/main" xmlns:r="http://schemas.openxmlformats.org/officeDocument/2006/relationships" xmlns:p="http://schemas.openxmlformats.org/presentationml/2006/main" xmlns:m="http://schemas.openxmlformats.org/officeDocument/2006/math" xmlns:w="http://schemas.openxmlformats.org/wordprocessingml/2006/main" showMasterPhAnim="0" show="1">
+  <p:cSld name="">
+    <p:bg>
+      <p:bgPr shadeToTitle="0">
+        <a:blipFill>
+          <a:blip r:embed="rId3">
+            <a:alphaModFix amt="23000"/>
+          </a:blip>
+          <a:stretch/>
+        </a:blipFill>
+      </p:bgPr>
+    </p:bg>
+    <p:spTree>
+      <p:nvGrpSpPr>
+        <p:cNvPr id="1" name=""/>
+        <p:cNvGrpSpPr/>
+        <p:nvPr/>
+      </p:nvGrpSpPr>
+      <p:grpSpPr bwMode="auto">
+        <a:xfrm>
+          <a:off x="0" y="0"/>
+          <a:ext cx="0" cy="0"/>
+          <a:chOff x="0" y="0"/>
+          <a:chExt cx="0" cy="0"/>
+        </a:xfrm>
+      </p:grpSpPr>
+      <p:sp>
+        <p:nvSpPr>
+          <p:cNvPr id="1430334485" name="Tytuł 1"/>
+          <p:cNvSpPr>
+            <a:spLocks noGrp="1"/>
+          </p:cNvSpPr>
+          <p:nvPr>
+            <p:ph type="title"/>
+          </p:nvPr>
+        </p:nvSpPr>
+        <p:spPr bwMode="auto"/>
+        <p:txBody>
+          <a:bodyPr/>
+          <a:lstStyle/>
+          <a:p>
+            <a:pPr>
+              <a:defRPr/>
+            </a:pPr>
+            <a:endParaRPr/>
+          </a:p>
+        </p:txBody>
+      </p:sp>
+      <p:sp>
+        <p:nvSpPr>
+          <p:cNvPr id="1177303339" name="Symbol zastępczy zawartości 2"/>
+          <p:cNvSpPr>
+            <a:spLocks noGrp="1"/>
+          </p:cNvSpPr>
+          <p:nvPr>
+            <p:ph idx="1"/>
+          </p:nvPr>
+        </p:nvSpPr>
+        <p:spPr bwMode="auto">
+          <a:xfrm flipH="0" flipV="0">
+            <a:off x="838198" y="1825624"/>
+            <a:ext cx="10515600" cy="4351338"/>
+          </a:xfrm>
+        </p:spPr>
+        <p:txBody>
+          <a:bodyPr vertOverflow="overflow" horzOverflow="overflow" vert="horz" wrap="square" lIns="91440" tIns="45720" rIns="91440" bIns="45720" numCol="1" spcCol="0" rtlCol="0" fromWordArt="0" anchor="t" anchorCtr="0" forceAA="0" upright="0" compatLnSpc="0">
+            <a:normAutofit/>
+          </a:bodyPr>
+          <a:lstStyle/>
+          <a:p>
+            <a:pPr>
+              <a:defRPr/>
+            </a:pPr>
+            <a:endParaRPr/>
+          </a:p>
+        </p:txBody>
+      </p:sp>
+    </p:spTree>
+  </p:cSld>
+  <p:clrMapOvr>
+    <a:masterClrMapping/>
+  </p:clrMapOvr>
+  <mc:AlternateContent xmlns:mc="http://schemas.openxmlformats.org/markup-compatibility/2006">
+    <mc:Choice xmlns:p159="http://schemas.microsoft.com/office/powerpoint/2015/09/main" xmlns:p14="http://schemas.microsoft.com/office/powerpoint/2010/main" Requires="p159">
+      <p:transition p14:dur="2000" advClick="1"/>
+    </mc:Choice>
+    <mc:Fallback>
+      <p:transition advClick="1"/>
+    </mc:Fallback>
+  </mc:AlternateContent>
+</p:sld>
+</file>
+
+<file path=ppt/slides/slide21.xml><?xml version="1.0" encoding="utf-8"?>
+<p:sld xmlns:a="http://schemas.openxmlformats.org/drawingml/2006/main" xmlns:r="http://schemas.openxmlformats.org/officeDocument/2006/relationships" xmlns:p="http://schemas.openxmlformats.org/presentationml/2006/main" xmlns:m="http://schemas.openxmlformats.org/officeDocument/2006/math" xmlns:w="http://schemas.openxmlformats.org/wordprocessingml/2006/main" showMasterPhAnim="0" show="1">
+  <p:cSld name="">
+    <p:bg>
+      <p:bgPr shadeToTitle="0">
+        <a:blipFill>
+          <a:blip r:embed="rId3">
+            <a:alphaModFix amt="23000"/>
+          </a:blip>
+          <a:stretch/>
+        </a:blipFill>
+      </p:bgPr>
+    </p:bg>
+    <p:spTree>
+      <p:nvGrpSpPr>
+        <p:cNvPr id="1" name=""/>
+        <p:cNvGrpSpPr/>
+        <p:nvPr/>
+      </p:nvGrpSpPr>
+      <p:grpSpPr bwMode="auto">
+        <a:xfrm>
+          <a:off x="0" y="0"/>
+          <a:ext cx="0" cy="0"/>
+          <a:chOff x="0" y="0"/>
+          <a:chExt cx="0" cy="0"/>
+        </a:xfrm>
+      </p:grpSpPr>
+      <p:sp>
+        <p:nvSpPr>
+          <p:cNvPr id="1190907077" name="Tytuł 1"/>
+          <p:cNvSpPr>
+            <a:spLocks noGrp="1"/>
+          </p:cNvSpPr>
+          <p:nvPr>
+            <p:ph type="title"/>
+          </p:nvPr>
+        </p:nvSpPr>
+        <p:spPr bwMode="auto"/>
+        <p:txBody>
+          <a:bodyPr/>
+          <a:lstStyle/>
+          <a:p>
+            <a:pPr>
+              <a:defRPr/>
+            </a:pPr>
+            <a:endParaRPr/>
+          </a:p>
+        </p:txBody>
+      </p:sp>
+      <p:sp>
+        <p:nvSpPr>
+          <p:cNvPr id="642647364" name="Symbol zastępczy zawartości 2"/>
+          <p:cNvSpPr>
+            <a:spLocks noGrp="1"/>
+          </p:cNvSpPr>
+          <p:nvPr>
+            <p:ph idx="1"/>
+          </p:nvPr>
+        </p:nvSpPr>
+        <p:spPr bwMode="auto">
+          <a:xfrm flipH="0" flipV="0">
+            <a:off x="838198" y="1825624"/>
+            <a:ext cx="10515600" cy="4351338"/>
+          </a:xfrm>
+        </p:spPr>
+        <p:txBody>
+          <a:bodyPr vertOverflow="overflow" horzOverflow="overflow" vert="horz" wrap="square" lIns="91440" tIns="45720" rIns="91440" bIns="45720" numCol="1" spcCol="0" rtlCol="0" fromWordArt="0" anchor="t" anchorCtr="0" forceAA="0" upright="0" compatLnSpc="0">
+            <a:normAutofit/>
+          </a:bodyPr>
+          <a:lstStyle/>
+          <a:p>
+            <a:pPr>
+              <a:defRPr/>
+            </a:pPr>
+            <a:endParaRPr/>
+          </a:p>
+        </p:txBody>
+      </p:sp>
     </p:spTree>
   </p:cSld>
   <p:clrMapOvr>
@@ -5957,7 +8207,17 @@
             </a:pPr>
             <a:r>
               <a:rPr/>
-              <a:t>Czy wszystkie dane </a:t>
+              <a:t>Czy wszystkie dane są nam potrzebne?</a:t>
+            </a:r>
+            <a:endParaRPr/>
+          </a:p>
+          <a:p>
+            <a:pPr lvl="1">
+              <a:defRPr/>
+            </a:pPr>
+            <a:r>
+              <a:rPr/>
+              <a:t>Przypomnienie: w każdym pliku dostajemy trzy wiersze. Jeden zawiera długość słowa, drugi samo słowo, a trzeci dwie liczby k1 i k2.</a:t>
             </a:r>
             <a:endParaRPr/>
           </a:p>
@@ -6008,7 +8268,7 @@
       </p:grpSpPr>
       <p:sp>
         <p:nvSpPr>
-          <p:cNvPr id="2070353033" name="Tytuł 1"/>
+          <p:cNvPr id="672482785" name="Tytuł 1"/>
           <p:cNvSpPr>
             <a:spLocks noGrp="1"/>
           </p:cNvSpPr>
@@ -6024,13 +8284,17 @@
             <a:pPr>
               <a:defRPr/>
             </a:pPr>
-            <a:endParaRPr/>
-          </a:p>
-        </p:txBody>
-      </p:sp>
-      <p:sp>
-        <p:nvSpPr>
-          <p:cNvPr id="155104210" name="Symbol zastępczy zawartości 2"/>
+            <a:r>
+              <a:rPr/>
+              <a:t>Potęga Pythona</a:t>
+            </a:r>
+            <a:endParaRPr/>
+          </a:p>
+        </p:txBody>
+      </p:sp>
+      <p:sp>
+        <p:nvSpPr>
+          <p:cNvPr id="289801736" name="Symbol zastępczy zawartości 2"/>
           <p:cNvSpPr>
             <a:spLocks noGrp="1"/>
           </p:cNvSpPr>
@@ -6040,19 +8304,70 @@
         </p:nvSpPr>
         <p:spPr bwMode="auto">
           <a:xfrm flipH="0" flipV="0">
-            <a:off x="838198" y="1825624"/>
+            <a:off x="838197" y="1825623"/>
             <a:ext cx="10515600" cy="4351338"/>
           </a:xfrm>
         </p:spPr>
         <p:txBody>
           <a:bodyPr vertOverflow="overflow" horzOverflow="overflow" vert="horz" wrap="square" lIns="91440" tIns="45720" rIns="91440" bIns="45720" numCol="1" spcCol="0" rtlCol="0" fromWordArt="0" anchor="t" anchorCtr="0" forceAA="0" upright="0" compatLnSpc="0">
-            <a:normAutofit/>
+            <a:normAutofit fontScale="95000" lnSpcReduction="1000"/>
           </a:bodyPr>
           <a:lstStyle/>
           <a:p>
             <a:pPr>
               <a:defRPr/>
             </a:pPr>
+            <a:r>
+              <a:rPr/>
+              <a:t>Czy wszystkie dane są nam potrzebne?</a:t>
+            </a:r>
+            <a:endParaRPr/>
+          </a:p>
+          <a:p>
+            <a:pPr lvl="1">
+              <a:defRPr/>
+            </a:pPr>
+            <a:r>
+              <a:rPr lang="pl-PL" sz="2400" b="0" i="0" u="none" strike="noStrike" cap="none" spc="0">
+                <a:solidFill>
+                  <a:schemeClr val="tx1"/>
+                </a:solidFill>
+                <a:latin typeface="+mn-lt"/>
+                <a:ea typeface="+mn-ea"/>
+                <a:cs typeface="+mn-cs"/>
+              </a:rPr>
+              <a:t>Przypomnienie: w każdym pliku dostajemy trzy wiersze. Jeden zawiera długość słowa, drugi samo słowo, a trzeci dwie liczby k1 i k2.</a:t>
+            </a:r>
+            <a:endParaRPr/>
+          </a:p>
+          <a:p>
+            <a:pPr lvl="0">
+              <a:defRPr/>
+            </a:pPr>
+            <a:r>
+              <a:rPr/>
+              <a:t>Linię z długościami słów możemy zignorować – Pyton sam może sprawdzić długość słów.</a:t>
+            </a:r>
+            <a:endParaRPr/>
+          </a:p>
+          <a:p>
+            <a:pPr lvl="0">
+              <a:defRPr/>
+            </a:pPr>
+            <a:r>
+              <a:rPr/>
+              <a:t>Tak samo jest z dołączonym opisem funkcji – u nas wystarczy porównanie (zwróćcie jednak uwagę na przypadki brzegowe – co, jeśli oba sufiksy są identyczne?)</a:t>
+            </a:r>
+            <a:endParaRPr/>
+          </a:p>
+          <a:p>
+            <a:pPr lvl="0">
+              <a:defRPr/>
+            </a:pPr>
+            <a:r>
+              <a:rPr/>
+              <a:t>Takie informacje są potrzebne użytkownikom języka C++, który działa na dużo niższym poziomie i pewne operacje trzeba realizować ręcznie</a:t>
+            </a:r>
             <a:endParaRPr/>
           </a:p>
         </p:txBody>
@@ -6102,7 +8417,7 @@
       </p:grpSpPr>
       <p:sp>
         <p:nvSpPr>
-          <p:cNvPr id="1690420137" name="Tytuł 1"/>
+          <p:cNvPr id="2070353033" name="Tytuł 1"/>
           <p:cNvSpPr>
             <a:spLocks noGrp="1"/>
           </p:cNvSpPr>
@@ -6118,13 +8433,17 @@
             <a:pPr>
               <a:defRPr/>
             </a:pPr>
-            <a:endParaRPr/>
-          </a:p>
-        </p:txBody>
-      </p:sp>
-      <p:sp>
-        <p:nvSpPr>
-          <p:cNvPr id="577362140" name="Symbol zastępczy zawartości 2"/>
+            <a:r>
+              <a:rPr/>
+              <a:t>Czy porównanie stringów wystarczy?</a:t>
+            </a:r>
+            <a:endParaRPr/>
+          </a:p>
+        </p:txBody>
+      </p:sp>
+      <p:sp>
+        <p:nvSpPr>
+          <p:cNvPr id="155104210" name="Symbol zastępczy zawartości 2"/>
           <p:cNvSpPr>
             <a:spLocks noGrp="1"/>
           </p:cNvSpPr>
@@ -6147,6 +8466,30 @@
             <a:pPr>
               <a:defRPr/>
             </a:pPr>
+            <a:r>
+              <a:rPr/>
+              <a:t>Czy zawsze dobrze wiemy, jak działa dana funkcja języka programowania?</a:t>
+            </a:r>
+            <a:endParaRPr/>
+          </a:p>
+          <a:p>
+            <a:pPr>
+              <a:defRPr/>
+            </a:pPr>
+            <a:r>
+              <a:rPr/>
+              <a:t>Nietrudno byłoby sobie wyobrazić sytuację, gdzie porównanie np. zawsze uznaje krótszy napis za mniejszy</a:t>
+            </a:r>
+            <a:endParaRPr/>
+          </a:p>
+          <a:p>
+            <a:pPr>
+              <a:defRPr/>
+            </a:pPr>
+            <a:r>
+              <a:rPr/>
+              <a:t>Jak sobie radzić takimi sytuacjami?</a:t>
+            </a:r>
             <a:endParaRPr/>
           </a:p>
         </p:txBody>

</xml_diff>